<commit_message>
Adiciona novo modelo de apresentação da arquitetura da pesquisa
</commit_message>
<xml_diff>
--- a/docs/Diagramas e Telas/Gerais/Diagrama Projeto Chaos.pptx
+++ b/docs/Diagramas e Telas/Gerais/Diagrama Projeto Chaos.pptx
@@ -6,6 +6,13 @@
   </p:sldMasterIdLst>
   <p:sldIdLst>
     <p:sldId id="256" r:id="rId2"/>
+    <p:sldId id="263" r:id="rId3"/>
+    <p:sldId id="262" r:id="rId4"/>
+    <p:sldId id="257" r:id="rId5"/>
+    <p:sldId id="258" r:id="rId6"/>
+    <p:sldId id="259" r:id="rId7"/>
+    <p:sldId id="260" r:id="rId8"/>
+    <p:sldId id="261" r:id="rId9"/>
   </p:sldIdLst>
   <p:sldSz cx="12192000" cy="6858000"/>
   <p:notesSz cx="6858000" cy="9144000"/>
@@ -241,7 +248,7 @@
           <a:p>
             <a:fld id="{1B9990B4-1470-43BD-AA9C-5EDB6161833D}" type="datetimeFigureOut">
               <a:rPr lang="pt-BR" smtClean="0"/>
-              <a:t>15/11/2019</a:t>
+              <a:t>13/12/2019</a:t>
             </a:fld>
             <a:endParaRPr lang="pt-BR"/>
           </a:p>
@@ -409,7 +416,7 @@
           <a:p>
             <a:fld id="{1B9990B4-1470-43BD-AA9C-5EDB6161833D}" type="datetimeFigureOut">
               <a:rPr lang="pt-BR" smtClean="0"/>
-              <a:t>15/11/2019</a:t>
+              <a:t>13/12/2019</a:t>
             </a:fld>
             <a:endParaRPr lang="pt-BR"/>
           </a:p>
@@ -587,7 +594,7 @@
           <a:p>
             <a:fld id="{1B9990B4-1470-43BD-AA9C-5EDB6161833D}" type="datetimeFigureOut">
               <a:rPr lang="pt-BR" smtClean="0"/>
-              <a:t>15/11/2019</a:t>
+              <a:t>13/12/2019</a:t>
             </a:fld>
             <a:endParaRPr lang="pt-BR"/>
           </a:p>
@@ -755,7 +762,7 @@
           <a:p>
             <a:fld id="{1B9990B4-1470-43BD-AA9C-5EDB6161833D}" type="datetimeFigureOut">
               <a:rPr lang="pt-BR" smtClean="0"/>
-              <a:t>15/11/2019</a:t>
+              <a:t>13/12/2019</a:t>
             </a:fld>
             <a:endParaRPr lang="pt-BR"/>
           </a:p>
@@ -1000,7 +1007,7 @@
           <a:p>
             <a:fld id="{1B9990B4-1470-43BD-AA9C-5EDB6161833D}" type="datetimeFigureOut">
               <a:rPr lang="pt-BR" smtClean="0"/>
-              <a:t>15/11/2019</a:t>
+              <a:t>13/12/2019</a:t>
             </a:fld>
             <a:endParaRPr lang="pt-BR"/>
           </a:p>
@@ -1229,7 +1236,7 @@
           <a:p>
             <a:fld id="{1B9990B4-1470-43BD-AA9C-5EDB6161833D}" type="datetimeFigureOut">
               <a:rPr lang="pt-BR" smtClean="0"/>
-              <a:t>15/11/2019</a:t>
+              <a:t>13/12/2019</a:t>
             </a:fld>
             <a:endParaRPr lang="pt-BR"/>
           </a:p>
@@ -1593,7 +1600,7 @@
           <a:p>
             <a:fld id="{1B9990B4-1470-43BD-AA9C-5EDB6161833D}" type="datetimeFigureOut">
               <a:rPr lang="pt-BR" smtClean="0"/>
-              <a:t>15/11/2019</a:t>
+              <a:t>13/12/2019</a:t>
             </a:fld>
             <a:endParaRPr lang="pt-BR"/>
           </a:p>
@@ -1710,7 +1717,7 @@
           <a:p>
             <a:fld id="{1B9990B4-1470-43BD-AA9C-5EDB6161833D}" type="datetimeFigureOut">
               <a:rPr lang="pt-BR" smtClean="0"/>
-              <a:t>15/11/2019</a:t>
+              <a:t>13/12/2019</a:t>
             </a:fld>
             <a:endParaRPr lang="pt-BR"/>
           </a:p>
@@ -1805,7 +1812,7 @@
           <a:p>
             <a:fld id="{1B9990B4-1470-43BD-AA9C-5EDB6161833D}" type="datetimeFigureOut">
               <a:rPr lang="pt-BR" smtClean="0"/>
-              <a:t>15/11/2019</a:t>
+              <a:t>13/12/2019</a:t>
             </a:fld>
             <a:endParaRPr lang="pt-BR"/>
           </a:p>
@@ -2080,7 +2087,7 @@
           <a:p>
             <a:fld id="{1B9990B4-1470-43BD-AA9C-5EDB6161833D}" type="datetimeFigureOut">
               <a:rPr lang="pt-BR" smtClean="0"/>
-              <a:t>15/11/2019</a:t>
+              <a:t>13/12/2019</a:t>
             </a:fld>
             <a:endParaRPr lang="pt-BR"/>
           </a:p>
@@ -2332,7 +2339,7 @@
           <a:p>
             <a:fld id="{1B9990B4-1470-43BD-AA9C-5EDB6161833D}" type="datetimeFigureOut">
               <a:rPr lang="pt-BR" smtClean="0"/>
-              <a:t>15/11/2019</a:t>
+              <a:t>13/12/2019</a:t>
             </a:fld>
             <a:endParaRPr lang="pt-BR"/>
           </a:p>
@@ -2543,7 +2550,7 @@
           <a:p>
             <a:fld id="{1B9990B4-1470-43BD-AA9C-5EDB6161833D}" type="datetimeFigureOut">
               <a:rPr lang="pt-BR" smtClean="0"/>
-              <a:t>15/11/2019</a:t>
+              <a:t>13/12/2019</a:t>
             </a:fld>
             <a:endParaRPr lang="pt-BR"/>
           </a:p>
@@ -2961,6 +2968,3815 @@
       </p:grpSpPr>
       <p:pic>
         <p:nvPicPr>
+          <p:cNvPr id="4" name="Imagem 3"/>
+          <p:cNvPicPr>
+            <a:picLocks noChangeAspect="1"/>
+          </p:cNvPicPr>
+          <p:nvPr/>
+        </p:nvPicPr>
+        <p:blipFill>
+          <a:blip r:embed="rId2" cstate="print">
+            <a:extLst>
+              <a:ext uri="{28A0092B-C50C-407E-A947-70E740481C1C}">
+                <a14:useLocalDpi xmlns:a14="http://schemas.microsoft.com/office/drawing/2010/main" val="0"/>
+              </a:ext>
+            </a:extLst>
+          </a:blip>
+          <a:stretch>
+            <a:fillRect/>
+          </a:stretch>
+        </p:blipFill>
+        <p:spPr>
+          <a:xfrm>
+            <a:off x="76611" y="271406"/>
+            <a:ext cx="1186172" cy="1260000"/>
+          </a:xfrm>
+          <a:prstGeom prst="rect">
+            <a:avLst/>
+          </a:prstGeom>
+        </p:spPr>
+      </p:pic>
+      <p:sp>
+        <p:nvSpPr>
+          <p:cNvPr id="15" name="CaixaDeTexto 14"/>
+          <p:cNvSpPr txBox="1"/>
+          <p:nvPr/>
+        </p:nvSpPr>
+        <p:spPr>
+          <a:xfrm>
+            <a:off x="1386651" y="561804"/>
+            <a:ext cx="2747440" cy="1200329"/>
+          </a:xfrm>
+          <a:prstGeom prst="rect">
+            <a:avLst/>
+          </a:prstGeom>
+          <a:noFill/>
+        </p:spPr>
+        <p:txBody>
+          <a:bodyPr wrap="square" rtlCol="0">
+            <a:spAutoFit/>
+          </a:bodyPr>
+          <a:lstStyle/>
+          <a:p>
+            <a:r>
+              <a:rPr lang="pt-BR" b="1" i="1" dirty="0">
+                <a:latin typeface="Roboto" panose="02000000000000000000" pitchFamily="2" charset="0"/>
+                <a:ea typeface="Roboto" panose="02000000000000000000" pitchFamily="2" charset="0"/>
+                <a:cs typeface="Roboto" panose="02000000000000000000" pitchFamily="2" charset="0"/>
+              </a:rPr>
+              <a:t>CALCULADORA E GERENCIADOR DE TAREFAS </a:t>
+            </a:r>
+            <a:r>
+              <a:rPr lang="pt-BR" i="1" dirty="0">
+                <a:latin typeface="Roboto" panose="02000000000000000000" pitchFamily="2" charset="0"/>
+                <a:ea typeface="Roboto" panose="02000000000000000000" pitchFamily="2" charset="0"/>
+                <a:cs typeface="Roboto" panose="02000000000000000000" pitchFamily="2" charset="0"/>
+              </a:rPr>
+              <a:t>COM ANGULAR 8</a:t>
+            </a:r>
+          </a:p>
+        </p:txBody>
+      </p:sp>
+    </p:spTree>
+    <p:extLst>
+      <p:ext uri="{BB962C8B-B14F-4D97-AF65-F5344CB8AC3E}">
+        <p14:creationId xmlns:p14="http://schemas.microsoft.com/office/powerpoint/2010/main" val="3413843860"/>
+      </p:ext>
+    </p:extLst>
+  </p:cSld>
+  <p:clrMapOvr>
+    <a:masterClrMapping/>
+  </p:clrMapOvr>
+  <p:timing>
+    <p:tnLst>
+      <p:par>
+        <p:cTn id="1" dur="indefinite" restart="never" nodeType="tmRoot"/>
+      </p:par>
+    </p:tnLst>
+  </p:timing>
+</p:sld>
+</file>
+
+<file path=ppt/slides/slide2.xml><?xml version="1.0" encoding="utf-8"?>
+<p:sld xmlns:a="http://schemas.openxmlformats.org/drawingml/2006/main" xmlns:r="http://schemas.openxmlformats.org/officeDocument/2006/relationships" xmlns:p="http://schemas.openxmlformats.org/presentationml/2006/main">
+  <p:cSld>
+    <p:bg>
+      <p:bgPr>
+        <a:solidFill>
+          <a:schemeClr val="bg1">
+            <a:lumMod val="85000"/>
+            <a:alpha val="70000"/>
+          </a:schemeClr>
+        </a:solidFill>
+        <a:effectLst/>
+      </p:bgPr>
+    </p:bg>
+    <p:spTree>
+      <p:nvGrpSpPr>
+        <p:cNvPr id="1" name=""/>
+        <p:cNvGrpSpPr/>
+        <p:nvPr/>
+      </p:nvGrpSpPr>
+      <p:grpSpPr>
+        <a:xfrm>
+          <a:off x="0" y="0"/>
+          <a:ext cx="0" cy="0"/>
+          <a:chOff x="0" y="0"/>
+          <a:chExt cx="0" cy="0"/>
+        </a:xfrm>
+      </p:grpSpPr>
+      <p:pic>
+        <p:nvPicPr>
+          <p:cNvPr id="4" name="Imagem 3"/>
+          <p:cNvPicPr>
+            <a:picLocks noChangeAspect="1"/>
+          </p:cNvPicPr>
+          <p:nvPr/>
+        </p:nvPicPr>
+        <p:blipFill>
+          <a:blip r:embed="rId2" cstate="print">
+            <a:extLst>
+              <a:ext uri="{28A0092B-C50C-407E-A947-70E740481C1C}">
+                <a14:useLocalDpi xmlns:a14="http://schemas.microsoft.com/office/drawing/2010/main" val="0"/>
+              </a:ext>
+            </a:extLst>
+          </a:blip>
+          <a:stretch>
+            <a:fillRect/>
+          </a:stretch>
+        </p:blipFill>
+        <p:spPr>
+          <a:xfrm>
+            <a:off x="76611" y="271406"/>
+            <a:ext cx="1186172" cy="1260000"/>
+          </a:xfrm>
+          <a:prstGeom prst="rect">
+            <a:avLst/>
+          </a:prstGeom>
+        </p:spPr>
+      </p:pic>
+      <p:pic>
+        <p:nvPicPr>
+          <p:cNvPr id="10" name="Imagem 9"/>
+          <p:cNvPicPr>
+            <a:picLocks noChangeAspect="1"/>
+          </p:cNvPicPr>
+          <p:nvPr/>
+        </p:nvPicPr>
+        <p:blipFill>
+          <a:blip r:embed="rId3" cstate="print">
+            <a:extLst>
+              <a:ext uri="{28A0092B-C50C-407E-A947-70E740481C1C}">
+                <a14:useLocalDpi xmlns:a14="http://schemas.microsoft.com/office/drawing/2010/main" val="0"/>
+              </a:ext>
+            </a:extLst>
+          </a:blip>
+          <a:stretch>
+            <a:fillRect/>
+          </a:stretch>
+        </p:blipFill>
+        <p:spPr>
+          <a:xfrm>
+            <a:off x="18684" y="2229483"/>
+            <a:ext cx="3801600" cy="1440000"/>
+          </a:xfrm>
+          <a:prstGeom prst="rect">
+            <a:avLst/>
+          </a:prstGeom>
+        </p:spPr>
+      </p:pic>
+      <p:sp>
+        <p:nvSpPr>
+          <p:cNvPr id="15" name="CaixaDeTexto 14"/>
+          <p:cNvSpPr txBox="1"/>
+          <p:nvPr/>
+        </p:nvSpPr>
+        <p:spPr>
+          <a:xfrm>
+            <a:off x="1386651" y="561804"/>
+            <a:ext cx="2747440" cy="1200329"/>
+          </a:xfrm>
+          <a:prstGeom prst="rect">
+            <a:avLst/>
+          </a:prstGeom>
+          <a:noFill/>
+        </p:spPr>
+        <p:txBody>
+          <a:bodyPr wrap="square" rtlCol="0">
+            <a:spAutoFit/>
+          </a:bodyPr>
+          <a:lstStyle/>
+          <a:p>
+            <a:r>
+              <a:rPr lang="pt-BR" b="1" i="1" dirty="0">
+                <a:latin typeface="Roboto" panose="02000000000000000000" pitchFamily="2" charset="0"/>
+                <a:ea typeface="Roboto" panose="02000000000000000000" pitchFamily="2" charset="0"/>
+                <a:cs typeface="Roboto" panose="02000000000000000000" pitchFamily="2" charset="0"/>
+              </a:rPr>
+              <a:t>CALCULADORA E GERENCIADOR DE TAREFAS </a:t>
+            </a:r>
+            <a:r>
+              <a:rPr lang="pt-BR" i="1" dirty="0">
+                <a:latin typeface="Roboto" panose="02000000000000000000" pitchFamily="2" charset="0"/>
+                <a:ea typeface="Roboto" panose="02000000000000000000" pitchFamily="2" charset="0"/>
+                <a:cs typeface="Roboto" panose="02000000000000000000" pitchFamily="2" charset="0"/>
+              </a:rPr>
+              <a:t>COM ANGULAR 8</a:t>
+            </a:r>
+          </a:p>
+        </p:txBody>
+      </p:sp>
+      <p:sp>
+        <p:nvSpPr>
+          <p:cNvPr id="17" name="CaixaDeTexto 16"/>
+          <p:cNvSpPr txBox="1"/>
+          <p:nvPr/>
+        </p:nvSpPr>
+        <p:spPr>
+          <a:xfrm>
+            <a:off x="152152" y="3729869"/>
+            <a:ext cx="3257767" cy="923330"/>
+          </a:xfrm>
+          <a:prstGeom prst="rect">
+            <a:avLst/>
+          </a:prstGeom>
+          <a:noFill/>
+        </p:spPr>
+        <p:txBody>
+          <a:bodyPr wrap="square" rtlCol="0">
+            <a:spAutoFit/>
+          </a:bodyPr>
+          <a:lstStyle/>
+          <a:p>
+            <a:r>
+              <a:rPr lang="pt-BR" b="1" i="1" dirty="0">
+                <a:latin typeface="Roboto" panose="02000000000000000000" pitchFamily="2" charset="0"/>
+                <a:ea typeface="Roboto" panose="02000000000000000000" pitchFamily="2" charset="0"/>
+                <a:cs typeface="Roboto" panose="02000000000000000000" pitchFamily="2" charset="0"/>
+              </a:rPr>
+              <a:t>BUSCADOR DE REPOSITÓRIOS </a:t>
+            </a:r>
+            <a:r>
+              <a:rPr lang="pt-BR" i="1" dirty="0">
+                <a:latin typeface="Roboto" panose="02000000000000000000" pitchFamily="2" charset="0"/>
+                <a:ea typeface="Roboto" panose="02000000000000000000" pitchFamily="2" charset="0"/>
+                <a:cs typeface="Roboto" panose="02000000000000000000" pitchFamily="2" charset="0"/>
+              </a:rPr>
+              <a:t>COM HTML 5, CSS 3 E JAVASCRIPT</a:t>
+            </a:r>
+          </a:p>
+        </p:txBody>
+      </p:sp>
+    </p:spTree>
+    <p:extLst>
+      <p:ext uri="{BB962C8B-B14F-4D97-AF65-F5344CB8AC3E}">
+        <p14:creationId xmlns:p14="http://schemas.microsoft.com/office/powerpoint/2010/main" val="2215720784"/>
+      </p:ext>
+    </p:extLst>
+  </p:cSld>
+  <p:clrMapOvr>
+    <a:masterClrMapping/>
+  </p:clrMapOvr>
+  <p:timing>
+    <p:tnLst>
+      <p:par>
+        <p:cTn id="1" dur="indefinite" restart="never" nodeType="tmRoot"/>
+      </p:par>
+    </p:tnLst>
+  </p:timing>
+</p:sld>
+</file>
+
+<file path=ppt/slides/slide3.xml><?xml version="1.0" encoding="utf-8"?>
+<p:sld xmlns:a="http://schemas.openxmlformats.org/drawingml/2006/main" xmlns:r="http://schemas.openxmlformats.org/officeDocument/2006/relationships" xmlns:p="http://schemas.openxmlformats.org/presentationml/2006/main">
+  <p:cSld>
+    <p:bg>
+      <p:bgPr>
+        <a:solidFill>
+          <a:schemeClr val="bg1">
+            <a:lumMod val="85000"/>
+            <a:alpha val="70000"/>
+          </a:schemeClr>
+        </a:solidFill>
+        <a:effectLst/>
+      </p:bgPr>
+    </p:bg>
+    <p:spTree>
+      <p:nvGrpSpPr>
+        <p:cNvPr id="1" name=""/>
+        <p:cNvGrpSpPr/>
+        <p:nvPr/>
+      </p:nvGrpSpPr>
+      <p:grpSpPr>
+        <a:xfrm>
+          <a:off x="0" y="0"/>
+          <a:ext cx="0" cy="0"/>
+          <a:chOff x="0" y="0"/>
+          <a:chExt cx="0" cy="0"/>
+        </a:xfrm>
+      </p:grpSpPr>
+      <p:pic>
+        <p:nvPicPr>
+          <p:cNvPr id="4" name="Imagem 3"/>
+          <p:cNvPicPr>
+            <a:picLocks noChangeAspect="1"/>
+          </p:cNvPicPr>
+          <p:nvPr/>
+        </p:nvPicPr>
+        <p:blipFill>
+          <a:blip r:embed="rId2" cstate="print">
+            <a:extLst>
+              <a:ext uri="{28A0092B-C50C-407E-A947-70E740481C1C}">
+                <a14:useLocalDpi xmlns:a14="http://schemas.microsoft.com/office/drawing/2010/main" val="0"/>
+              </a:ext>
+            </a:extLst>
+          </a:blip>
+          <a:stretch>
+            <a:fillRect/>
+          </a:stretch>
+        </p:blipFill>
+        <p:spPr>
+          <a:xfrm>
+            <a:off x="76611" y="271406"/>
+            <a:ext cx="1186172" cy="1260000"/>
+          </a:xfrm>
+          <a:prstGeom prst="rect">
+            <a:avLst/>
+          </a:prstGeom>
+        </p:spPr>
+      </p:pic>
+      <p:pic>
+        <p:nvPicPr>
+          <p:cNvPr id="10" name="Imagem 9"/>
+          <p:cNvPicPr>
+            <a:picLocks noChangeAspect="1"/>
+          </p:cNvPicPr>
+          <p:nvPr/>
+        </p:nvPicPr>
+        <p:blipFill>
+          <a:blip r:embed="rId3" cstate="print">
+            <a:extLst>
+              <a:ext uri="{28A0092B-C50C-407E-A947-70E740481C1C}">
+                <a14:useLocalDpi xmlns:a14="http://schemas.microsoft.com/office/drawing/2010/main" val="0"/>
+              </a:ext>
+            </a:extLst>
+          </a:blip>
+          <a:stretch>
+            <a:fillRect/>
+          </a:stretch>
+        </p:blipFill>
+        <p:spPr>
+          <a:xfrm>
+            <a:off x="18684" y="2229483"/>
+            <a:ext cx="3801600" cy="1440000"/>
+          </a:xfrm>
+          <a:prstGeom prst="rect">
+            <a:avLst/>
+          </a:prstGeom>
+        </p:spPr>
+      </p:pic>
+      <p:pic>
+        <p:nvPicPr>
+          <p:cNvPr id="13" name="Imagem 12"/>
+          <p:cNvPicPr>
+            <a:picLocks noChangeAspect="1"/>
+          </p:cNvPicPr>
+          <p:nvPr/>
+        </p:nvPicPr>
+        <p:blipFill>
+          <a:blip r:embed="rId4" cstate="print">
+            <a:extLst>
+              <a:ext uri="{28A0092B-C50C-407E-A947-70E740481C1C}">
+                <a14:useLocalDpi xmlns:a14="http://schemas.microsoft.com/office/drawing/2010/main" val="0"/>
+              </a:ext>
+            </a:extLst>
+          </a:blip>
+          <a:stretch>
+            <a:fillRect/>
+          </a:stretch>
+        </p:blipFill>
+        <p:spPr>
+          <a:xfrm>
+            <a:off x="367394" y="4796030"/>
+            <a:ext cx="2350682" cy="1440000"/>
+          </a:xfrm>
+          <a:prstGeom prst="rect">
+            <a:avLst/>
+          </a:prstGeom>
+        </p:spPr>
+      </p:pic>
+      <p:sp>
+        <p:nvSpPr>
+          <p:cNvPr id="15" name="CaixaDeTexto 14"/>
+          <p:cNvSpPr txBox="1"/>
+          <p:nvPr/>
+        </p:nvSpPr>
+        <p:spPr>
+          <a:xfrm>
+            <a:off x="1386651" y="561804"/>
+            <a:ext cx="2747440" cy="1200329"/>
+          </a:xfrm>
+          <a:prstGeom prst="rect">
+            <a:avLst/>
+          </a:prstGeom>
+          <a:noFill/>
+        </p:spPr>
+        <p:txBody>
+          <a:bodyPr wrap="square" rtlCol="0">
+            <a:spAutoFit/>
+          </a:bodyPr>
+          <a:lstStyle/>
+          <a:p>
+            <a:r>
+              <a:rPr lang="pt-BR" b="1" i="1" dirty="0">
+                <a:latin typeface="Roboto" panose="02000000000000000000" pitchFamily="2" charset="0"/>
+                <a:ea typeface="Roboto" panose="02000000000000000000" pitchFamily="2" charset="0"/>
+                <a:cs typeface="Roboto" panose="02000000000000000000" pitchFamily="2" charset="0"/>
+              </a:rPr>
+              <a:t>CALCULADORA E GERENCIADOR DE TAREFAS </a:t>
+            </a:r>
+            <a:r>
+              <a:rPr lang="pt-BR" i="1" dirty="0">
+                <a:latin typeface="Roboto" panose="02000000000000000000" pitchFamily="2" charset="0"/>
+                <a:ea typeface="Roboto" panose="02000000000000000000" pitchFamily="2" charset="0"/>
+                <a:cs typeface="Roboto" panose="02000000000000000000" pitchFamily="2" charset="0"/>
+              </a:rPr>
+              <a:t>COM ANGULAR 8</a:t>
+            </a:r>
+          </a:p>
+        </p:txBody>
+      </p:sp>
+      <p:sp>
+        <p:nvSpPr>
+          <p:cNvPr id="17" name="CaixaDeTexto 16"/>
+          <p:cNvSpPr txBox="1"/>
+          <p:nvPr/>
+        </p:nvSpPr>
+        <p:spPr>
+          <a:xfrm>
+            <a:off x="152152" y="3729869"/>
+            <a:ext cx="3257767" cy="923330"/>
+          </a:xfrm>
+          <a:prstGeom prst="rect">
+            <a:avLst/>
+          </a:prstGeom>
+          <a:noFill/>
+        </p:spPr>
+        <p:txBody>
+          <a:bodyPr wrap="square" rtlCol="0">
+            <a:spAutoFit/>
+          </a:bodyPr>
+          <a:lstStyle/>
+          <a:p>
+            <a:r>
+              <a:rPr lang="pt-BR" b="1" i="1" dirty="0">
+                <a:latin typeface="Roboto" panose="02000000000000000000" pitchFamily="2" charset="0"/>
+                <a:ea typeface="Roboto" panose="02000000000000000000" pitchFamily="2" charset="0"/>
+                <a:cs typeface="Roboto" panose="02000000000000000000" pitchFamily="2" charset="0"/>
+              </a:rPr>
+              <a:t>BUSCADOR DE REPOSITÓRIOS </a:t>
+            </a:r>
+            <a:r>
+              <a:rPr lang="pt-BR" i="1" dirty="0">
+                <a:latin typeface="Roboto" panose="02000000000000000000" pitchFamily="2" charset="0"/>
+                <a:ea typeface="Roboto" panose="02000000000000000000" pitchFamily="2" charset="0"/>
+                <a:cs typeface="Roboto" panose="02000000000000000000" pitchFamily="2" charset="0"/>
+              </a:rPr>
+              <a:t>COM HTML 5, CSS 3 E JAVASCRIPT</a:t>
+            </a:r>
+          </a:p>
+        </p:txBody>
+      </p:sp>
+      <p:sp>
+        <p:nvSpPr>
+          <p:cNvPr id="18" name="CaixaDeTexto 17"/>
+          <p:cNvSpPr txBox="1"/>
+          <p:nvPr/>
+        </p:nvSpPr>
+        <p:spPr>
+          <a:xfrm>
+            <a:off x="2058436" y="5912864"/>
+            <a:ext cx="2797511" cy="923330"/>
+          </a:xfrm>
+          <a:prstGeom prst="rect">
+            <a:avLst/>
+          </a:prstGeom>
+          <a:noFill/>
+        </p:spPr>
+        <p:txBody>
+          <a:bodyPr wrap="square" rtlCol="0">
+            <a:spAutoFit/>
+          </a:bodyPr>
+          <a:lstStyle/>
+          <a:p>
+            <a:r>
+              <a:rPr lang="pt-BR" b="1" i="1" dirty="0">
+                <a:latin typeface="Roboto" panose="02000000000000000000" pitchFamily="2" charset="0"/>
+                <a:ea typeface="Roboto" panose="02000000000000000000" pitchFamily="2" charset="0"/>
+                <a:cs typeface="Roboto" panose="02000000000000000000" pitchFamily="2" charset="0"/>
+              </a:rPr>
+              <a:t>API REST DE TERMOS ÚTEIS </a:t>
+            </a:r>
+            <a:r>
+              <a:rPr lang="pt-BR" i="1" dirty="0">
+                <a:latin typeface="Roboto" panose="02000000000000000000" pitchFamily="2" charset="0"/>
+                <a:ea typeface="Roboto" panose="02000000000000000000" pitchFamily="2" charset="0"/>
+                <a:cs typeface="Roboto" panose="02000000000000000000" pitchFamily="2" charset="0"/>
+              </a:rPr>
+              <a:t>COM NODEJS E MONGODB</a:t>
+            </a:r>
+          </a:p>
+        </p:txBody>
+      </p:sp>
+      <p:pic>
+        <p:nvPicPr>
+          <p:cNvPr id="3" name="Imagem 2">
+            <a:extLst>
+              <a:ext uri="{FF2B5EF4-FFF2-40B4-BE49-F238E27FC236}">
+                <a16:creationId xmlns:a16="http://schemas.microsoft.com/office/drawing/2014/main" id="{10B15967-B736-4459-9A79-72CA7DBE35F4}"/>
+              </a:ext>
+            </a:extLst>
+          </p:cNvPr>
+          <p:cNvPicPr>
+            <a:picLocks noChangeAspect="1"/>
+          </p:cNvPicPr>
+          <p:nvPr/>
+        </p:nvPicPr>
+        <p:blipFill>
+          <a:blip r:embed="rId5" cstate="print">
+            <a:extLst>
+              <a:ext uri="{28A0092B-C50C-407E-A947-70E740481C1C}">
+                <a14:useLocalDpi xmlns:a14="http://schemas.microsoft.com/office/drawing/2010/main" val="0"/>
+              </a:ext>
+            </a:extLst>
+          </a:blip>
+          <a:stretch>
+            <a:fillRect/>
+          </a:stretch>
+        </p:blipFill>
+        <p:spPr>
+          <a:xfrm>
+            <a:off x="219831" y="6207572"/>
+            <a:ext cx="1796681" cy="485087"/>
+          </a:xfrm>
+          <a:prstGeom prst="rect">
+            <a:avLst/>
+          </a:prstGeom>
+        </p:spPr>
+      </p:pic>
+    </p:spTree>
+    <p:extLst>
+      <p:ext uri="{BB962C8B-B14F-4D97-AF65-F5344CB8AC3E}">
+        <p14:creationId xmlns:p14="http://schemas.microsoft.com/office/powerpoint/2010/main" val="3452892562"/>
+      </p:ext>
+    </p:extLst>
+  </p:cSld>
+  <p:clrMapOvr>
+    <a:masterClrMapping/>
+  </p:clrMapOvr>
+  <p:timing>
+    <p:tnLst>
+      <p:par>
+        <p:cTn id="1" dur="indefinite" restart="never" nodeType="tmRoot"/>
+      </p:par>
+    </p:tnLst>
+  </p:timing>
+</p:sld>
+</file>
+
+<file path=ppt/slides/slide4.xml><?xml version="1.0" encoding="utf-8"?>
+<p:sld xmlns:a="http://schemas.openxmlformats.org/drawingml/2006/main" xmlns:r="http://schemas.openxmlformats.org/officeDocument/2006/relationships" xmlns:p="http://schemas.openxmlformats.org/presentationml/2006/main">
+  <p:cSld>
+    <p:bg>
+      <p:bgPr>
+        <a:solidFill>
+          <a:schemeClr val="bg1">
+            <a:lumMod val="85000"/>
+            <a:alpha val="70000"/>
+          </a:schemeClr>
+        </a:solidFill>
+        <a:effectLst/>
+      </p:bgPr>
+    </p:bg>
+    <p:spTree>
+      <p:nvGrpSpPr>
+        <p:cNvPr id="1" name=""/>
+        <p:cNvGrpSpPr/>
+        <p:nvPr/>
+      </p:nvGrpSpPr>
+      <p:grpSpPr>
+        <a:xfrm>
+          <a:off x="0" y="0"/>
+          <a:ext cx="0" cy="0"/>
+          <a:chOff x="0" y="0"/>
+          <a:chExt cx="0" cy="0"/>
+        </a:xfrm>
+      </p:grpSpPr>
+      <p:pic>
+        <p:nvPicPr>
+          <p:cNvPr id="4" name="Imagem 3"/>
+          <p:cNvPicPr>
+            <a:picLocks noChangeAspect="1"/>
+          </p:cNvPicPr>
+          <p:nvPr/>
+        </p:nvPicPr>
+        <p:blipFill>
+          <a:blip r:embed="rId2" cstate="print">
+            <a:extLst>
+              <a:ext uri="{28A0092B-C50C-407E-A947-70E740481C1C}">
+                <a14:useLocalDpi xmlns:a14="http://schemas.microsoft.com/office/drawing/2010/main" val="0"/>
+              </a:ext>
+            </a:extLst>
+          </a:blip>
+          <a:stretch>
+            <a:fillRect/>
+          </a:stretch>
+        </p:blipFill>
+        <p:spPr>
+          <a:xfrm>
+            <a:off x="76611" y="271406"/>
+            <a:ext cx="1186172" cy="1260000"/>
+          </a:xfrm>
+          <a:prstGeom prst="rect">
+            <a:avLst/>
+          </a:prstGeom>
+        </p:spPr>
+      </p:pic>
+      <p:pic>
+        <p:nvPicPr>
+          <p:cNvPr id="7" name="Imagem 6"/>
+          <p:cNvPicPr>
+            <a:picLocks noChangeAspect="1"/>
+          </p:cNvPicPr>
+          <p:nvPr/>
+        </p:nvPicPr>
+        <p:blipFill>
+          <a:blip r:embed="rId3" cstate="print">
+            <a:extLst>
+              <a:ext uri="{28A0092B-C50C-407E-A947-70E740481C1C}">
+                <a14:useLocalDpi xmlns:a14="http://schemas.microsoft.com/office/drawing/2010/main" val="0"/>
+              </a:ext>
+            </a:extLst>
+          </a:blip>
+          <a:stretch>
+            <a:fillRect/>
+          </a:stretch>
+        </p:blipFill>
+        <p:spPr>
+          <a:xfrm>
+            <a:off x="5543075" y="2268671"/>
+            <a:ext cx="1682984" cy="1440000"/>
+          </a:xfrm>
+          <a:prstGeom prst="rect">
+            <a:avLst/>
+          </a:prstGeom>
+        </p:spPr>
+      </p:pic>
+      <p:pic>
+        <p:nvPicPr>
+          <p:cNvPr id="10" name="Imagem 9"/>
+          <p:cNvPicPr>
+            <a:picLocks noChangeAspect="1"/>
+          </p:cNvPicPr>
+          <p:nvPr/>
+        </p:nvPicPr>
+        <p:blipFill>
+          <a:blip r:embed="rId4" cstate="print">
+            <a:extLst>
+              <a:ext uri="{28A0092B-C50C-407E-A947-70E740481C1C}">
+                <a14:useLocalDpi xmlns:a14="http://schemas.microsoft.com/office/drawing/2010/main" val="0"/>
+              </a:ext>
+            </a:extLst>
+          </a:blip>
+          <a:stretch>
+            <a:fillRect/>
+          </a:stretch>
+        </p:blipFill>
+        <p:spPr>
+          <a:xfrm>
+            <a:off x="18684" y="2229483"/>
+            <a:ext cx="3801600" cy="1440000"/>
+          </a:xfrm>
+          <a:prstGeom prst="rect">
+            <a:avLst/>
+          </a:prstGeom>
+        </p:spPr>
+      </p:pic>
+      <p:pic>
+        <p:nvPicPr>
+          <p:cNvPr id="13" name="Imagem 12"/>
+          <p:cNvPicPr>
+            <a:picLocks noChangeAspect="1"/>
+          </p:cNvPicPr>
+          <p:nvPr/>
+        </p:nvPicPr>
+        <p:blipFill>
+          <a:blip r:embed="rId5" cstate="print">
+            <a:extLst>
+              <a:ext uri="{28A0092B-C50C-407E-A947-70E740481C1C}">
+                <a14:useLocalDpi xmlns:a14="http://schemas.microsoft.com/office/drawing/2010/main" val="0"/>
+              </a:ext>
+            </a:extLst>
+          </a:blip>
+          <a:stretch>
+            <a:fillRect/>
+          </a:stretch>
+        </p:blipFill>
+        <p:spPr>
+          <a:xfrm>
+            <a:off x="367394" y="4796030"/>
+            <a:ext cx="2350682" cy="1440000"/>
+          </a:xfrm>
+          <a:prstGeom prst="rect">
+            <a:avLst/>
+          </a:prstGeom>
+        </p:spPr>
+      </p:pic>
+      <p:sp>
+        <p:nvSpPr>
+          <p:cNvPr id="15" name="CaixaDeTexto 14"/>
+          <p:cNvSpPr txBox="1"/>
+          <p:nvPr/>
+        </p:nvSpPr>
+        <p:spPr>
+          <a:xfrm>
+            <a:off x="1386651" y="561804"/>
+            <a:ext cx="2747440" cy="1200329"/>
+          </a:xfrm>
+          <a:prstGeom prst="rect">
+            <a:avLst/>
+          </a:prstGeom>
+          <a:noFill/>
+        </p:spPr>
+        <p:txBody>
+          <a:bodyPr wrap="square" rtlCol="0">
+            <a:spAutoFit/>
+          </a:bodyPr>
+          <a:lstStyle/>
+          <a:p>
+            <a:r>
+              <a:rPr lang="pt-BR" b="1" i="1" dirty="0">
+                <a:latin typeface="Roboto" panose="02000000000000000000" pitchFamily="2" charset="0"/>
+                <a:ea typeface="Roboto" panose="02000000000000000000" pitchFamily="2" charset="0"/>
+                <a:cs typeface="Roboto" panose="02000000000000000000" pitchFamily="2" charset="0"/>
+              </a:rPr>
+              <a:t>CALCULADORA E GERENCIADOR DE TAREFAS </a:t>
+            </a:r>
+            <a:r>
+              <a:rPr lang="pt-BR" i="1" dirty="0">
+                <a:latin typeface="Roboto" panose="02000000000000000000" pitchFamily="2" charset="0"/>
+                <a:ea typeface="Roboto" panose="02000000000000000000" pitchFamily="2" charset="0"/>
+                <a:cs typeface="Roboto" panose="02000000000000000000" pitchFamily="2" charset="0"/>
+              </a:rPr>
+              <a:t>COM ANGULAR 8</a:t>
+            </a:r>
+          </a:p>
+        </p:txBody>
+      </p:sp>
+      <p:sp>
+        <p:nvSpPr>
+          <p:cNvPr id="17" name="CaixaDeTexto 16"/>
+          <p:cNvSpPr txBox="1"/>
+          <p:nvPr/>
+        </p:nvSpPr>
+        <p:spPr>
+          <a:xfrm>
+            <a:off x="152152" y="3729869"/>
+            <a:ext cx="3257767" cy="923330"/>
+          </a:xfrm>
+          <a:prstGeom prst="rect">
+            <a:avLst/>
+          </a:prstGeom>
+          <a:noFill/>
+        </p:spPr>
+        <p:txBody>
+          <a:bodyPr wrap="square" rtlCol="0">
+            <a:spAutoFit/>
+          </a:bodyPr>
+          <a:lstStyle/>
+          <a:p>
+            <a:r>
+              <a:rPr lang="pt-BR" b="1" i="1" dirty="0">
+                <a:latin typeface="Roboto" panose="02000000000000000000" pitchFamily="2" charset="0"/>
+                <a:ea typeface="Roboto" panose="02000000000000000000" pitchFamily="2" charset="0"/>
+                <a:cs typeface="Roboto" panose="02000000000000000000" pitchFamily="2" charset="0"/>
+              </a:rPr>
+              <a:t>BUSCADOR DE REPOSITÓRIOS </a:t>
+            </a:r>
+            <a:r>
+              <a:rPr lang="pt-BR" i="1" dirty="0">
+                <a:latin typeface="Roboto" panose="02000000000000000000" pitchFamily="2" charset="0"/>
+                <a:ea typeface="Roboto" panose="02000000000000000000" pitchFamily="2" charset="0"/>
+                <a:cs typeface="Roboto" panose="02000000000000000000" pitchFamily="2" charset="0"/>
+              </a:rPr>
+              <a:t>COM HTML 5, CSS 3 E JAVASCRIPT</a:t>
+            </a:r>
+          </a:p>
+        </p:txBody>
+      </p:sp>
+      <p:sp>
+        <p:nvSpPr>
+          <p:cNvPr id="18" name="CaixaDeTexto 17"/>
+          <p:cNvSpPr txBox="1"/>
+          <p:nvPr/>
+        </p:nvSpPr>
+        <p:spPr>
+          <a:xfrm>
+            <a:off x="2058436" y="5912864"/>
+            <a:ext cx="2797511" cy="923330"/>
+          </a:xfrm>
+          <a:prstGeom prst="rect">
+            <a:avLst/>
+          </a:prstGeom>
+          <a:noFill/>
+        </p:spPr>
+        <p:txBody>
+          <a:bodyPr wrap="square" rtlCol="0">
+            <a:spAutoFit/>
+          </a:bodyPr>
+          <a:lstStyle/>
+          <a:p>
+            <a:r>
+              <a:rPr lang="pt-BR" b="1" i="1" dirty="0">
+                <a:latin typeface="Roboto" panose="02000000000000000000" pitchFamily="2" charset="0"/>
+                <a:ea typeface="Roboto" panose="02000000000000000000" pitchFamily="2" charset="0"/>
+                <a:cs typeface="Roboto" panose="02000000000000000000" pitchFamily="2" charset="0"/>
+              </a:rPr>
+              <a:t>API REST DE TERMOS ÚTEIS </a:t>
+            </a:r>
+            <a:r>
+              <a:rPr lang="pt-BR" i="1" dirty="0">
+                <a:latin typeface="Roboto" panose="02000000000000000000" pitchFamily="2" charset="0"/>
+                <a:ea typeface="Roboto" panose="02000000000000000000" pitchFamily="2" charset="0"/>
+                <a:cs typeface="Roboto" panose="02000000000000000000" pitchFamily="2" charset="0"/>
+              </a:rPr>
+              <a:t>COM NODEJS E MONGODB</a:t>
+            </a:r>
+          </a:p>
+        </p:txBody>
+      </p:sp>
+      <p:cxnSp>
+        <p:nvCxnSpPr>
+          <p:cNvPr id="23" name="Conector de Seta Reta 22"/>
+          <p:cNvCxnSpPr/>
+          <p:nvPr/>
+        </p:nvCxnSpPr>
+        <p:spPr>
+          <a:xfrm flipV="1">
+            <a:off x="3121159" y="3396343"/>
+            <a:ext cx="2234301" cy="1589213"/>
+          </a:xfrm>
+          <a:prstGeom prst="straightConnector1">
+            <a:avLst/>
+          </a:prstGeom>
+          <a:ln w="57150">
+            <a:solidFill>
+              <a:schemeClr val="tx1">
+                <a:lumMod val="50000"/>
+                <a:lumOff val="50000"/>
+              </a:schemeClr>
+            </a:solidFill>
+            <a:tailEnd type="triangle"/>
+          </a:ln>
+        </p:spPr>
+        <p:style>
+          <a:lnRef idx="1">
+            <a:schemeClr val="accent1"/>
+          </a:lnRef>
+          <a:fillRef idx="0">
+            <a:schemeClr val="accent1"/>
+          </a:fillRef>
+          <a:effectRef idx="0">
+            <a:schemeClr val="accent1"/>
+          </a:effectRef>
+          <a:fontRef idx="minor">
+            <a:schemeClr val="tx1"/>
+          </a:fontRef>
+        </p:style>
+      </p:cxnSp>
+      <p:cxnSp>
+        <p:nvCxnSpPr>
+          <p:cNvPr id="24" name="Conector de Seta Reta 23"/>
+          <p:cNvCxnSpPr/>
+          <p:nvPr/>
+        </p:nvCxnSpPr>
+        <p:spPr>
+          <a:xfrm>
+            <a:off x="3993894" y="2937626"/>
+            <a:ext cx="1432391" cy="13259"/>
+          </a:xfrm>
+          <a:prstGeom prst="straightConnector1">
+            <a:avLst/>
+          </a:prstGeom>
+          <a:ln w="57150">
+            <a:solidFill>
+              <a:schemeClr val="tx1">
+                <a:lumMod val="50000"/>
+                <a:lumOff val="50000"/>
+              </a:schemeClr>
+            </a:solidFill>
+            <a:tailEnd type="triangle"/>
+          </a:ln>
+        </p:spPr>
+        <p:style>
+          <a:lnRef idx="1">
+            <a:schemeClr val="accent1"/>
+          </a:lnRef>
+          <a:fillRef idx="0">
+            <a:schemeClr val="accent1"/>
+          </a:fillRef>
+          <a:effectRef idx="0">
+            <a:schemeClr val="accent1"/>
+          </a:effectRef>
+          <a:fontRef idx="minor">
+            <a:schemeClr val="tx1"/>
+          </a:fontRef>
+        </p:style>
+      </p:cxnSp>
+      <p:cxnSp>
+        <p:nvCxnSpPr>
+          <p:cNvPr id="28" name="Conector de Seta Reta 27"/>
+          <p:cNvCxnSpPr/>
+          <p:nvPr/>
+        </p:nvCxnSpPr>
+        <p:spPr>
+          <a:xfrm>
+            <a:off x="3401540" y="1289084"/>
+            <a:ext cx="2040142" cy="1227612"/>
+          </a:xfrm>
+          <a:prstGeom prst="straightConnector1">
+            <a:avLst/>
+          </a:prstGeom>
+          <a:ln w="57150">
+            <a:solidFill>
+              <a:schemeClr val="tx1">
+                <a:lumMod val="50000"/>
+                <a:lumOff val="50000"/>
+              </a:schemeClr>
+            </a:solidFill>
+            <a:tailEnd type="triangle"/>
+          </a:ln>
+        </p:spPr>
+        <p:style>
+          <a:lnRef idx="1">
+            <a:schemeClr val="accent1"/>
+          </a:lnRef>
+          <a:fillRef idx="0">
+            <a:schemeClr val="accent1"/>
+          </a:fillRef>
+          <a:effectRef idx="0">
+            <a:schemeClr val="accent1"/>
+          </a:effectRef>
+          <a:fontRef idx="minor">
+            <a:schemeClr val="tx1"/>
+          </a:fontRef>
+        </p:style>
+      </p:cxnSp>
+      <p:sp>
+        <p:nvSpPr>
+          <p:cNvPr id="72" name="CaixaDeTexto 71"/>
+          <p:cNvSpPr txBox="1"/>
+          <p:nvPr/>
+        </p:nvSpPr>
+        <p:spPr>
+          <a:xfrm>
+            <a:off x="5943817" y="3964779"/>
+            <a:ext cx="454706" cy="523220"/>
+          </a:xfrm>
+          <a:prstGeom prst="rect">
+            <a:avLst/>
+          </a:prstGeom>
+          <a:noFill/>
+        </p:spPr>
+        <p:txBody>
+          <a:bodyPr wrap="square" rtlCol="0">
+            <a:spAutoFit/>
+          </a:bodyPr>
+          <a:lstStyle/>
+          <a:p>
+            <a:r>
+              <a:rPr lang="pt-BR" sz="2800" b="1" i="1" dirty="0">
+                <a:latin typeface="Roboto" panose="02000000000000000000" pitchFamily="2" charset="0"/>
+                <a:ea typeface="Roboto" panose="02000000000000000000" pitchFamily="2" charset="0"/>
+                <a:cs typeface="Roboto" panose="02000000000000000000" pitchFamily="2" charset="0"/>
+              </a:rPr>
+              <a:t>1</a:t>
+            </a:r>
+            <a:endParaRPr lang="pt-BR" b="1" i="1" dirty="0">
+              <a:latin typeface="Roboto" panose="02000000000000000000" pitchFamily="2" charset="0"/>
+              <a:ea typeface="Roboto" panose="02000000000000000000" pitchFamily="2" charset="0"/>
+              <a:cs typeface="Roboto" panose="02000000000000000000" pitchFamily="2" charset="0"/>
+            </a:endParaRPr>
+          </a:p>
+        </p:txBody>
+      </p:sp>
+      <p:sp>
+        <p:nvSpPr>
+          <p:cNvPr id="78" name="CaixaDeTexto 77"/>
+          <p:cNvSpPr txBox="1"/>
+          <p:nvPr/>
+        </p:nvSpPr>
+        <p:spPr>
+          <a:xfrm>
+            <a:off x="4927928" y="4531832"/>
+            <a:ext cx="2308631" cy="923330"/>
+          </a:xfrm>
+          <a:prstGeom prst="rect">
+            <a:avLst/>
+          </a:prstGeom>
+          <a:noFill/>
+        </p:spPr>
+        <p:txBody>
+          <a:bodyPr wrap="square" rtlCol="0">
+            <a:spAutoFit/>
+          </a:bodyPr>
+          <a:lstStyle/>
+          <a:p>
+            <a:r>
+              <a:rPr lang="pt-BR" i="1" dirty="0">
+                <a:latin typeface="Roboto" panose="02000000000000000000" pitchFamily="2" charset="0"/>
+                <a:ea typeface="Roboto" panose="02000000000000000000" pitchFamily="2" charset="0"/>
+                <a:cs typeface="Roboto" panose="02000000000000000000" pitchFamily="2" charset="0"/>
+              </a:rPr>
+              <a:t>CONTÊINERIZAÇÃO DAS 4 APLICAÇÕES COM </a:t>
+            </a:r>
+            <a:r>
+              <a:rPr lang="pt-BR" b="1" i="1" dirty="0">
+                <a:latin typeface="Roboto" panose="02000000000000000000" pitchFamily="2" charset="0"/>
+                <a:ea typeface="Roboto" panose="02000000000000000000" pitchFamily="2" charset="0"/>
+                <a:cs typeface="Roboto" panose="02000000000000000000" pitchFamily="2" charset="0"/>
+              </a:rPr>
+              <a:t>DOCKER</a:t>
+            </a:r>
+          </a:p>
+        </p:txBody>
+      </p:sp>
+      <p:pic>
+        <p:nvPicPr>
+          <p:cNvPr id="3" name="Imagem 2">
+            <a:extLst>
+              <a:ext uri="{FF2B5EF4-FFF2-40B4-BE49-F238E27FC236}">
+                <a16:creationId xmlns:a16="http://schemas.microsoft.com/office/drawing/2014/main" id="{10B15967-B736-4459-9A79-72CA7DBE35F4}"/>
+              </a:ext>
+            </a:extLst>
+          </p:cNvPr>
+          <p:cNvPicPr>
+            <a:picLocks noChangeAspect="1"/>
+          </p:cNvPicPr>
+          <p:nvPr/>
+        </p:nvPicPr>
+        <p:blipFill>
+          <a:blip r:embed="rId6" cstate="print">
+            <a:extLst>
+              <a:ext uri="{28A0092B-C50C-407E-A947-70E740481C1C}">
+                <a14:useLocalDpi xmlns:a14="http://schemas.microsoft.com/office/drawing/2010/main" val="0"/>
+              </a:ext>
+            </a:extLst>
+          </a:blip>
+          <a:stretch>
+            <a:fillRect/>
+          </a:stretch>
+        </p:blipFill>
+        <p:spPr>
+          <a:xfrm>
+            <a:off x="219831" y="6207572"/>
+            <a:ext cx="1796681" cy="485087"/>
+          </a:xfrm>
+          <a:prstGeom prst="rect">
+            <a:avLst/>
+          </a:prstGeom>
+        </p:spPr>
+      </p:pic>
+    </p:spTree>
+    <p:extLst>
+      <p:ext uri="{BB962C8B-B14F-4D97-AF65-F5344CB8AC3E}">
+        <p14:creationId xmlns:p14="http://schemas.microsoft.com/office/powerpoint/2010/main" val="1707195789"/>
+      </p:ext>
+    </p:extLst>
+  </p:cSld>
+  <p:clrMapOvr>
+    <a:masterClrMapping/>
+  </p:clrMapOvr>
+  <p:timing>
+    <p:tnLst>
+      <p:par>
+        <p:cTn id="1" dur="indefinite" restart="never" nodeType="tmRoot"/>
+      </p:par>
+    </p:tnLst>
+  </p:timing>
+</p:sld>
+</file>
+
+<file path=ppt/slides/slide5.xml><?xml version="1.0" encoding="utf-8"?>
+<p:sld xmlns:a="http://schemas.openxmlformats.org/drawingml/2006/main" xmlns:r="http://schemas.openxmlformats.org/officeDocument/2006/relationships" xmlns:p="http://schemas.openxmlformats.org/presentationml/2006/main">
+  <p:cSld>
+    <p:bg>
+      <p:bgPr>
+        <a:solidFill>
+          <a:schemeClr val="bg1">
+            <a:lumMod val="85000"/>
+            <a:alpha val="70000"/>
+          </a:schemeClr>
+        </a:solidFill>
+        <a:effectLst/>
+      </p:bgPr>
+    </p:bg>
+    <p:spTree>
+      <p:nvGrpSpPr>
+        <p:cNvPr id="1" name=""/>
+        <p:cNvGrpSpPr/>
+        <p:nvPr/>
+      </p:nvGrpSpPr>
+      <p:grpSpPr>
+        <a:xfrm>
+          <a:off x="0" y="0"/>
+          <a:ext cx="0" cy="0"/>
+          <a:chOff x="0" y="0"/>
+          <a:chExt cx="0" cy="0"/>
+        </a:xfrm>
+      </p:grpSpPr>
+      <p:pic>
+        <p:nvPicPr>
+          <p:cNvPr id="4" name="Imagem 3"/>
+          <p:cNvPicPr>
+            <a:picLocks noChangeAspect="1"/>
+          </p:cNvPicPr>
+          <p:nvPr/>
+        </p:nvPicPr>
+        <p:blipFill>
+          <a:blip r:embed="rId2" cstate="print">
+            <a:extLst>
+              <a:ext uri="{28A0092B-C50C-407E-A947-70E740481C1C}">
+                <a14:useLocalDpi xmlns:a14="http://schemas.microsoft.com/office/drawing/2010/main" val="0"/>
+              </a:ext>
+            </a:extLst>
+          </a:blip>
+          <a:stretch>
+            <a:fillRect/>
+          </a:stretch>
+        </p:blipFill>
+        <p:spPr>
+          <a:xfrm>
+            <a:off x="76611" y="271406"/>
+            <a:ext cx="1186172" cy="1260000"/>
+          </a:xfrm>
+          <a:prstGeom prst="rect">
+            <a:avLst/>
+          </a:prstGeom>
+        </p:spPr>
+      </p:pic>
+      <p:pic>
+        <p:nvPicPr>
+          <p:cNvPr id="7" name="Imagem 6"/>
+          <p:cNvPicPr>
+            <a:picLocks noChangeAspect="1"/>
+          </p:cNvPicPr>
+          <p:nvPr/>
+        </p:nvPicPr>
+        <p:blipFill>
+          <a:blip r:embed="rId3" cstate="print">
+            <a:extLst>
+              <a:ext uri="{28A0092B-C50C-407E-A947-70E740481C1C}">
+                <a14:useLocalDpi xmlns:a14="http://schemas.microsoft.com/office/drawing/2010/main" val="0"/>
+              </a:ext>
+            </a:extLst>
+          </a:blip>
+          <a:stretch>
+            <a:fillRect/>
+          </a:stretch>
+        </p:blipFill>
+        <p:spPr>
+          <a:xfrm>
+            <a:off x="5543075" y="2268671"/>
+            <a:ext cx="1682984" cy="1440000"/>
+          </a:xfrm>
+          <a:prstGeom prst="rect">
+            <a:avLst/>
+          </a:prstGeom>
+        </p:spPr>
+      </p:pic>
+      <p:pic>
+        <p:nvPicPr>
+          <p:cNvPr id="10" name="Imagem 9"/>
+          <p:cNvPicPr>
+            <a:picLocks noChangeAspect="1"/>
+          </p:cNvPicPr>
+          <p:nvPr/>
+        </p:nvPicPr>
+        <p:blipFill>
+          <a:blip r:embed="rId4" cstate="print">
+            <a:extLst>
+              <a:ext uri="{28A0092B-C50C-407E-A947-70E740481C1C}">
+                <a14:useLocalDpi xmlns:a14="http://schemas.microsoft.com/office/drawing/2010/main" val="0"/>
+              </a:ext>
+            </a:extLst>
+          </a:blip>
+          <a:stretch>
+            <a:fillRect/>
+          </a:stretch>
+        </p:blipFill>
+        <p:spPr>
+          <a:xfrm>
+            <a:off x="18684" y="2229483"/>
+            <a:ext cx="3801600" cy="1440000"/>
+          </a:xfrm>
+          <a:prstGeom prst="rect">
+            <a:avLst/>
+          </a:prstGeom>
+        </p:spPr>
+      </p:pic>
+      <p:grpSp>
+        <p:nvGrpSpPr>
+          <p:cNvPr id="54" name="Agrupar 53"/>
+          <p:cNvGrpSpPr/>
+          <p:nvPr/>
+        </p:nvGrpSpPr>
+        <p:grpSpPr>
+          <a:xfrm rot="1456573">
+            <a:off x="9680247" y="208324"/>
+            <a:ext cx="2564552" cy="2317849"/>
+            <a:chOff x="8159238" y="1647205"/>
+            <a:chExt cx="2564552" cy="2317849"/>
+          </a:xfrm>
+        </p:grpSpPr>
+        <p:pic>
+          <p:nvPicPr>
+            <p:cNvPr id="11" name="Imagem 10"/>
+            <p:cNvPicPr>
+              <a:picLocks noChangeAspect="1"/>
+            </p:cNvPicPr>
+            <p:nvPr/>
+          </p:nvPicPr>
+          <p:blipFill>
+            <a:blip r:embed="rId5" cstate="print">
+              <a:extLst>
+                <a:ext uri="{28A0092B-C50C-407E-A947-70E740481C1C}">
+                  <a14:useLocalDpi xmlns:a14="http://schemas.microsoft.com/office/drawing/2010/main" val="0"/>
+                </a:ext>
+              </a:extLst>
+            </a:blip>
+            <a:stretch>
+              <a:fillRect/>
+            </a:stretch>
+          </p:blipFill>
+          <p:spPr>
+            <a:xfrm rot="19998745">
+              <a:off x="9240528" y="2525054"/>
+              <a:ext cx="1483262" cy="1440000"/>
+            </a:xfrm>
+            <a:prstGeom prst="rect">
+              <a:avLst/>
+            </a:prstGeom>
+          </p:spPr>
+        </p:pic>
+        <p:pic>
+          <p:nvPicPr>
+            <p:cNvPr id="12" name="Imagem 11"/>
+            <p:cNvPicPr>
+              <a:picLocks noChangeAspect="1"/>
+            </p:cNvPicPr>
+            <p:nvPr/>
+          </p:nvPicPr>
+          <p:blipFill>
+            <a:blip r:embed="rId6" cstate="print">
+              <a:extLst>
+                <a:ext uri="{28A0092B-C50C-407E-A947-70E740481C1C}">
+                  <a14:useLocalDpi xmlns:a14="http://schemas.microsoft.com/office/drawing/2010/main" val="0"/>
+                </a:ext>
+              </a:extLst>
+            </a:blip>
+            <a:stretch>
+              <a:fillRect/>
+            </a:stretch>
+          </p:blipFill>
+          <p:spPr>
+            <a:xfrm>
+              <a:off x="8159238" y="1647205"/>
+              <a:ext cx="1484111" cy="1440000"/>
+            </a:xfrm>
+            <a:prstGeom prst="rect">
+              <a:avLst/>
+            </a:prstGeom>
+          </p:spPr>
+        </p:pic>
+      </p:grpSp>
+      <p:pic>
+        <p:nvPicPr>
+          <p:cNvPr id="13" name="Imagem 12"/>
+          <p:cNvPicPr>
+            <a:picLocks noChangeAspect="1"/>
+          </p:cNvPicPr>
+          <p:nvPr/>
+        </p:nvPicPr>
+        <p:blipFill>
+          <a:blip r:embed="rId7" cstate="print">
+            <a:extLst>
+              <a:ext uri="{28A0092B-C50C-407E-A947-70E740481C1C}">
+                <a14:useLocalDpi xmlns:a14="http://schemas.microsoft.com/office/drawing/2010/main" val="0"/>
+              </a:ext>
+            </a:extLst>
+          </a:blip>
+          <a:stretch>
+            <a:fillRect/>
+          </a:stretch>
+        </p:blipFill>
+        <p:spPr>
+          <a:xfrm>
+            <a:off x="367394" y="4796030"/>
+            <a:ext cx="2350682" cy="1440000"/>
+          </a:xfrm>
+          <a:prstGeom prst="rect">
+            <a:avLst/>
+          </a:prstGeom>
+        </p:spPr>
+      </p:pic>
+      <p:sp>
+        <p:nvSpPr>
+          <p:cNvPr id="15" name="CaixaDeTexto 14"/>
+          <p:cNvSpPr txBox="1"/>
+          <p:nvPr/>
+        </p:nvSpPr>
+        <p:spPr>
+          <a:xfrm>
+            <a:off x="1386651" y="561804"/>
+            <a:ext cx="2747440" cy="1200329"/>
+          </a:xfrm>
+          <a:prstGeom prst="rect">
+            <a:avLst/>
+          </a:prstGeom>
+          <a:noFill/>
+        </p:spPr>
+        <p:txBody>
+          <a:bodyPr wrap="square" rtlCol="0">
+            <a:spAutoFit/>
+          </a:bodyPr>
+          <a:lstStyle/>
+          <a:p>
+            <a:r>
+              <a:rPr lang="pt-BR" b="1" i="1" dirty="0">
+                <a:latin typeface="Roboto" panose="02000000000000000000" pitchFamily="2" charset="0"/>
+                <a:ea typeface="Roboto" panose="02000000000000000000" pitchFamily="2" charset="0"/>
+                <a:cs typeface="Roboto" panose="02000000000000000000" pitchFamily="2" charset="0"/>
+              </a:rPr>
+              <a:t>CALCULADORA E GERENCIADOR DE TAREFAS </a:t>
+            </a:r>
+            <a:r>
+              <a:rPr lang="pt-BR" i="1" dirty="0">
+                <a:latin typeface="Roboto" panose="02000000000000000000" pitchFamily="2" charset="0"/>
+                <a:ea typeface="Roboto" panose="02000000000000000000" pitchFamily="2" charset="0"/>
+                <a:cs typeface="Roboto" panose="02000000000000000000" pitchFamily="2" charset="0"/>
+              </a:rPr>
+              <a:t>COM ANGULAR 8</a:t>
+            </a:r>
+          </a:p>
+        </p:txBody>
+      </p:sp>
+      <p:sp>
+        <p:nvSpPr>
+          <p:cNvPr id="17" name="CaixaDeTexto 16"/>
+          <p:cNvSpPr txBox="1"/>
+          <p:nvPr/>
+        </p:nvSpPr>
+        <p:spPr>
+          <a:xfrm>
+            <a:off x="152152" y="3729869"/>
+            <a:ext cx="3257767" cy="923330"/>
+          </a:xfrm>
+          <a:prstGeom prst="rect">
+            <a:avLst/>
+          </a:prstGeom>
+          <a:noFill/>
+        </p:spPr>
+        <p:txBody>
+          <a:bodyPr wrap="square" rtlCol="0">
+            <a:spAutoFit/>
+          </a:bodyPr>
+          <a:lstStyle/>
+          <a:p>
+            <a:r>
+              <a:rPr lang="pt-BR" b="1" i="1" dirty="0">
+                <a:latin typeface="Roboto" panose="02000000000000000000" pitchFamily="2" charset="0"/>
+                <a:ea typeface="Roboto" panose="02000000000000000000" pitchFamily="2" charset="0"/>
+                <a:cs typeface="Roboto" panose="02000000000000000000" pitchFamily="2" charset="0"/>
+              </a:rPr>
+              <a:t>BUSCADOR DE REPOSITÓRIOS </a:t>
+            </a:r>
+            <a:r>
+              <a:rPr lang="pt-BR" i="1" dirty="0">
+                <a:latin typeface="Roboto" panose="02000000000000000000" pitchFamily="2" charset="0"/>
+                <a:ea typeface="Roboto" panose="02000000000000000000" pitchFamily="2" charset="0"/>
+                <a:cs typeface="Roboto" panose="02000000000000000000" pitchFamily="2" charset="0"/>
+              </a:rPr>
+              <a:t>COM HTML 5, CSS 3 E JAVASCRIPT</a:t>
+            </a:r>
+          </a:p>
+        </p:txBody>
+      </p:sp>
+      <p:sp>
+        <p:nvSpPr>
+          <p:cNvPr id="18" name="CaixaDeTexto 17"/>
+          <p:cNvSpPr txBox="1"/>
+          <p:nvPr/>
+        </p:nvSpPr>
+        <p:spPr>
+          <a:xfrm>
+            <a:off x="2058436" y="5912864"/>
+            <a:ext cx="2797511" cy="923330"/>
+          </a:xfrm>
+          <a:prstGeom prst="rect">
+            <a:avLst/>
+          </a:prstGeom>
+          <a:noFill/>
+        </p:spPr>
+        <p:txBody>
+          <a:bodyPr wrap="square" rtlCol="0">
+            <a:spAutoFit/>
+          </a:bodyPr>
+          <a:lstStyle/>
+          <a:p>
+            <a:r>
+              <a:rPr lang="pt-BR" b="1" i="1" dirty="0">
+                <a:latin typeface="Roboto" panose="02000000000000000000" pitchFamily="2" charset="0"/>
+                <a:ea typeface="Roboto" panose="02000000000000000000" pitchFamily="2" charset="0"/>
+                <a:cs typeface="Roboto" panose="02000000000000000000" pitchFamily="2" charset="0"/>
+              </a:rPr>
+              <a:t>API REST DE TERMOS ÚTEIS </a:t>
+            </a:r>
+            <a:r>
+              <a:rPr lang="pt-BR" i="1" dirty="0">
+                <a:latin typeface="Roboto" panose="02000000000000000000" pitchFamily="2" charset="0"/>
+                <a:ea typeface="Roboto" panose="02000000000000000000" pitchFamily="2" charset="0"/>
+                <a:cs typeface="Roboto" panose="02000000000000000000" pitchFamily="2" charset="0"/>
+              </a:rPr>
+              <a:t>COM NODEJS E MONGODB</a:t>
+            </a:r>
+          </a:p>
+        </p:txBody>
+      </p:sp>
+      <p:cxnSp>
+        <p:nvCxnSpPr>
+          <p:cNvPr id="23" name="Conector de Seta Reta 22"/>
+          <p:cNvCxnSpPr/>
+          <p:nvPr/>
+        </p:nvCxnSpPr>
+        <p:spPr>
+          <a:xfrm flipV="1">
+            <a:off x="3121159" y="3396343"/>
+            <a:ext cx="2234301" cy="1589213"/>
+          </a:xfrm>
+          <a:prstGeom prst="straightConnector1">
+            <a:avLst/>
+          </a:prstGeom>
+          <a:ln w="57150">
+            <a:solidFill>
+              <a:schemeClr val="tx1">
+                <a:lumMod val="50000"/>
+                <a:lumOff val="50000"/>
+              </a:schemeClr>
+            </a:solidFill>
+            <a:tailEnd type="triangle"/>
+          </a:ln>
+        </p:spPr>
+        <p:style>
+          <a:lnRef idx="1">
+            <a:schemeClr val="accent1"/>
+          </a:lnRef>
+          <a:fillRef idx="0">
+            <a:schemeClr val="accent1"/>
+          </a:fillRef>
+          <a:effectRef idx="0">
+            <a:schemeClr val="accent1"/>
+          </a:effectRef>
+          <a:fontRef idx="minor">
+            <a:schemeClr val="tx1"/>
+          </a:fontRef>
+        </p:style>
+      </p:cxnSp>
+      <p:cxnSp>
+        <p:nvCxnSpPr>
+          <p:cNvPr id="24" name="Conector de Seta Reta 23"/>
+          <p:cNvCxnSpPr/>
+          <p:nvPr/>
+        </p:nvCxnSpPr>
+        <p:spPr>
+          <a:xfrm>
+            <a:off x="3993894" y="2937626"/>
+            <a:ext cx="1432391" cy="13259"/>
+          </a:xfrm>
+          <a:prstGeom prst="straightConnector1">
+            <a:avLst/>
+          </a:prstGeom>
+          <a:ln w="57150">
+            <a:solidFill>
+              <a:schemeClr val="tx1">
+                <a:lumMod val="50000"/>
+                <a:lumOff val="50000"/>
+              </a:schemeClr>
+            </a:solidFill>
+            <a:tailEnd type="triangle"/>
+          </a:ln>
+        </p:spPr>
+        <p:style>
+          <a:lnRef idx="1">
+            <a:schemeClr val="accent1"/>
+          </a:lnRef>
+          <a:fillRef idx="0">
+            <a:schemeClr val="accent1"/>
+          </a:fillRef>
+          <a:effectRef idx="0">
+            <a:schemeClr val="accent1"/>
+          </a:effectRef>
+          <a:fontRef idx="minor">
+            <a:schemeClr val="tx1"/>
+          </a:fontRef>
+        </p:style>
+      </p:cxnSp>
+      <p:cxnSp>
+        <p:nvCxnSpPr>
+          <p:cNvPr id="28" name="Conector de Seta Reta 27"/>
+          <p:cNvCxnSpPr/>
+          <p:nvPr/>
+        </p:nvCxnSpPr>
+        <p:spPr>
+          <a:xfrm>
+            <a:off x="3401540" y="1289084"/>
+            <a:ext cx="2040142" cy="1227612"/>
+          </a:xfrm>
+          <a:prstGeom prst="straightConnector1">
+            <a:avLst/>
+          </a:prstGeom>
+          <a:ln w="57150">
+            <a:solidFill>
+              <a:schemeClr val="tx1">
+                <a:lumMod val="50000"/>
+                <a:lumOff val="50000"/>
+              </a:schemeClr>
+            </a:solidFill>
+            <a:tailEnd type="triangle"/>
+          </a:ln>
+        </p:spPr>
+        <p:style>
+          <a:lnRef idx="1">
+            <a:schemeClr val="accent1"/>
+          </a:lnRef>
+          <a:fillRef idx="0">
+            <a:schemeClr val="accent1"/>
+          </a:fillRef>
+          <a:effectRef idx="0">
+            <a:schemeClr val="accent1"/>
+          </a:effectRef>
+          <a:fontRef idx="minor">
+            <a:schemeClr val="tx1"/>
+          </a:fontRef>
+        </p:style>
+      </p:cxnSp>
+      <p:cxnSp>
+        <p:nvCxnSpPr>
+          <p:cNvPr id="55" name="Conector de Seta Reta 54"/>
+          <p:cNvCxnSpPr/>
+          <p:nvPr/>
+        </p:nvCxnSpPr>
+        <p:spPr>
+          <a:xfrm flipV="1">
+            <a:off x="7413674" y="1833564"/>
+            <a:ext cx="2652585" cy="783028"/>
+          </a:xfrm>
+          <a:prstGeom prst="straightConnector1">
+            <a:avLst/>
+          </a:prstGeom>
+          <a:ln w="57150">
+            <a:solidFill>
+              <a:schemeClr val="tx1">
+                <a:lumMod val="50000"/>
+                <a:lumOff val="50000"/>
+              </a:schemeClr>
+            </a:solidFill>
+            <a:tailEnd type="triangle"/>
+          </a:ln>
+        </p:spPr>
+        <p:style>
+          <a:lnRef idx="1">
+            <a:schemeClr val="accent1"/>
+          </a:lnRef>
+          <a:fillRef idx="0">
+            <a:schemeClr val="accent1"/>
+          </a:fillRef>
+          <a:effectRef idx="0">
+            <a:schemeClr val="accent1"/>
+          </a:effectRef>
+          <a:fontRef idx="minor">
+            <a:schemeClr val="tx1"/>
+          </a:fontRef>
+        </p:style>
+      </p:cxnSp>
+      <p:sp>
+        <p:nvSpPr>
+          <p:cNvPr id="72" name="CaixaDeTexto 71"/>
+          <p:cNvSpPr txBox="1"/>
+          <p:nvPr/>
+        </p:nvSpPr>
+        <p:spPr>
+          <a:xfrm>
+            <a:off x="5943817" y="3964779"/>
+            <a:ext cx="454706" cy="523220"/>
+          </a:xfrm>
+          <a:prstGeom prst="rect">
+            <a:avLst/>
+          </a:prstGeom>
+          <a:noFill/>
+        </p:spPr>
+        <p:txBody>
+          <a:bodyPr wrap="square" rtlCol="0">
+            <a:spAutoFit/>
+          </a:bodyPr>
+          <a:lstStyle/>
+          <a:p>
+            <a:r>
+              <a:rPr lang="pt-BR" sz="2800" b="1" i="1" dirty="0">
+                <a:latin typeface="Roboto" panose="02000000000000000000" pitchFamily="2" charset="0"/>
+                <a:ea typeface="Roboto" panose="02000000000000000000" pitchFamily="2" charset="0"/>
+                <a:cs typeface="Roboto" panose="02000000000000000000" pitchFamily="2" charset="0"/>
+              </a:rPr>
+              <a:t>1</a:t>
+            </a:r>
+            <a:endParaRPr lang="pt-BR" b="1" i="1" dirty="0">
+              <a:latin typeface="Roboto" panose="02000000000000000000" pitchFamily="2" charset="0"/>
+              <a:ea typeface="Roboto" panose="02000000000000000000" pitchFamily="2" charset="0"/>
+              <a:cs typeface="Roboto" panose="02000000000000000000" pitchFamily="2" charset="0"/>
+            </a:endParaRPr>
+          </a:p>
+        </p:txBody>
+      </p:sp>
+      <p:sp>
+        <p:nvSpPr>
+          <p:cNvPr id="73" name="CaixaDeTexto 72"/>
+          <p:cNvSpPr txBox="1"/>
+          <p:nvPr/>
+        </p:nvSpPr>
+        <p:spPr>
+          <a:xfrm>
+            <a:off x="9100083" y="2156243"/>
+            <a:ext cx="454706" cy="523220"/>
+          </a:xfrm>
+          <a:prstGeom prst="rect">
+            <a:avLst/>
+          </a:prstGeom>
+          <a:noFill/>
+        </p:spPr>
+        <p:txBody>
+          <a:bodyPr wrap="square" rtlCol="0">
+            <a:spAutoFit/>
+          </a:bodyPr>
+          <a:lstStyle/>
+          <a:p>
+            <a:r>
+              <a:rPr lang="pt-BR" sz="2800" b="1" i="1" dirty="0">
+                <a:latin typeface="Roboto" panose="02000000000000000000" pitchFamily="2" charset="0"/>
+                <a:ea typeface="Roboto" panose="02000000000000000000" pitchFamily="2" charset="0"/>
+                <a:cs typeface="Roboto" panose="02000000000000000000" pitchFamily="2" charset="0"/>
+              </a:rPr>
+              <a:t>2</a:t>
+            </a:r>
+            <a:endParaRPr lang="pt-BR" b="1" i="1" dirty="0">
+              <a:latin typeface="Roboto" panose="02000000000000000000" pitchFamily="2" charset="0"/>
+              <a:ea typeface="Roboto" panose="02000000000000000000" pitchFamily="2" charset="0"/>
+              <a:cs typeface="Roboto" panose="02000000000000000000" pitchFamily="2" charset="0"/>
+            </a:endParaRPr>
+          </a:p>
+        </p:txBody>
+      </p:sp>
+      <p:sp>
+        <p:nvSpPr>
+          <p:cNvPr id="77" name="CaixaDeTexto 76"/>
+          <p:cNvSpPr txBox="1"/>
+          <p:nvPr/>
+        </p:nvSpPr>
+        <p:spPr>
+          <a:xfrm>
+            <a:off x="8234903" y="2657909"/>
+            <a:ext cx="2185066" cy="1477328"/>
+          </a:xfrm>
+          <a:prstGeom prst="rect">
+            <a:avLst/>
+          </a:prstGeom>
+          <a:noFill/>
+        </p:spPr>
+        <p:txBody>
+          <a:bodyPr wrap="square" rtlCol="0">
+            <a:spAutoFit/>
+          </a:bodyPr>
+          <a:lstStyle/>
+          <a:p>
+            <a:r>
+              <a:rPr lang="pt-BR" i="1" dirty="0">
+                <a:latin typeface="Roboto" panose="02000000000000000000" pitchFamily="2" charset="0"/>
+                <a:ea typeface="Roboto" panose="02000000000000000000" pitchFamily="2" charset="0"/>
+                <a:cs typeface="Roboto" panose="02000000000000000000" pitchFamily="2" charset="0"/>
+              </a:rPr>
+              <a:t>OSQUESTRAÇÃO DOS CONTÊINERS </a:t>
+            </a:r>
+            <a:r>
+              <a:rPr lang="pt-BR" b="1" i="1" dirty="0">
+                <a:latin typeface="Roboto" panose="02000000000000000000" pitchFamily="2" charset="0"/>
+                <a:ea typeface="Roboto" panose="02000000000000000000" pitchFamily="2" charset="0"/>
+                <a:cs typeface="Roboto" panose="02000000000000000000" pitchFamily="2" charset="0"/>
+              </a:rPr>
+              <a:t>DOCKER </a:t>
+            </a:r>
+            <a:r>
+              <a:rPr lang="pt-BR" i="1" dirty="0">
+                <a:latin typeface="Roboto" panose="02000000000000000000" pitchFamily="2" charset="0"/>
+                <a:ea typeface="Roboto" panose="02000000000000000000" pitchFamily="2" charset="0"/>
+                <a:cs typeface="Roboto" panose="02000000000000000000" pitchFamily="2" charset="0"/>
+              </a:rPr>
+              <a:t>COM </a:t>
+            </a:r>
+            <a:r>
+              <a:rPr lang="pt-BR" b="1" i="1" dirty="0">
+                <a:latin typeface="Roboto" panose="02000000000000000000" pitchFamily="2" charset="0"/>
+                <a:ea typeface="Roboto" panose="02000000000000000000" pitchFamily="2" charset="0"/>
+                <a:cs typeface="Roboto" panose="02000000000000000000" pitchFamily="2" charset="0"/>
+              </a:rPr>
+              <a:t>KUBERNETES MINIKUBE</a:t>
+            </a:r>
+          </a:p>
+        </p:txBody>
+      </p:sp>
+      <p:sp>
+        <p:nvSpPr>
+          <p:cNvPr id="78" name="CaixaDeTexto 77"/>
+          <p:cNvSpPr txBox="1"/>
+          <p:nvPr/>
+        </p:nvSpPr>
+        <p:spPr>
+          <a:xfrm>
+            <a:off x="4927928" y="4531832"/>
+            <a:ext cx="2308631" cy="923330"/>
+          </a:xfrm>
+          <a:prstGeom prst="rect">
+            <a:avLst/>
+          </a:prstGeom>
+          <a:noFill/>
+        </p:spPr>
+        <p:txBody>
+          <a:bodyPr wrap="square" rtlCol="0">
+            <a:spAutoFit/>
+          </a:bodyPr>
+          <a:lstStyle/>
+          <a:p>
+            <a:r>
+              <a:rPr lang="pt-BR" i="1" dirty="0">
+                <a:latin typeface="Roboto" panose="02000000000000000000" pitchFamily="2" charset="0"/>
+                <a:ea typeface="Roboto" panose="02000000000000000000" pitchFamily="2" charset="0"/>
+                <a:cs typeface="Roboto" panose="02000000000000000000" pitchFamily="2" charset="0"/>
+              </a:rPr>
+              <a:t>CONTÊINERIZAÇÃO DAS 4 APLICAÇÕES COM </a:t>
+            </a:r>
+            <a:r>
+              <a:rPr lang="pt-BR" b="1" i="1" dirty="0">
+                <a:latin typeface="Roboto" panose="02000000000000000000" pitchFamily="2" charset="0"/>
+                <a:ea typeface="Roboto" panose="02000000000000000000" pitchFamily="2" charset="0"/>
+                <a:cs typeface="Roboto" panose="02000000000000000000" pitchFamily="2" charset="0"/>
+              </a:rPr>
+              <a:t>DOCKER</a:t>
+            </a:r>
+          </a:p>
+        </p:txBody>
+      </p:sp>
+      <p:pic>
+        <p:nvPicPr>
+          <p:cNvPr id="3" name="Imagem 2">
+            <a:extLst>
+              <a:ext uri="{FF2B5EF4-FFF2-40B4-BE49-F238E27FC236}">
+                <a16:creationId xmlns:a16="http://schemas.microsoft.com/office/drawing/2014/main" id="{10B15967-B736-4459-9A79-72CA7DBE35F4}"/>
+              </a:ext>
+            </a:extLst>
+          </p:cNvPr>
+          <p:cNvPicPr>
+            <a:picLocks noChangeAspect="1"/>
+          </p:cNvPicPr>
+          <p:nvPr/>
+        </p:nvPicPr>
+        <p:blipFill>
+          <a:blip r:embed="rId8" cstate="print">
+            <a:extLst>
+              <a:ext uri="{28A0092B-C50C-407E-A947-70E740481C1C}">
+                <a14:useLocalDpi xmlns:a14="http://schemas.microsoft.com/office/drawing/2010/main" val="0"/>
+              </a:ext>
+            </a:extLst>
+          </a:blip>
+          <a:stretch>
+            <a:fillRect/>
+          </a:stretch>
+        </p:blipFill>
+        <p:spPr>
+          <a:xfrm>
+            <a:off x="219831" y="6207572"/>
+            <a:ext cx="1796681" cy="485087"/>
+          </a:xfrm>
+          <a:prstGeom prst="rect">
+            <a:avLst/>
+          </a:prstGeom>
+        </p:spPr>
+      </p:pic>
+    </p:spTree>
+    <p:extLst>
+      <p:ext uri="{BB962C8B-B14F-4D97-AF65-F5344CB8AC3E}">
+        <p14:creationId xmlns:p14="http://schemas.microsoft.com/office/powerpoint/2010/main" val="3914701063"/>
+      </p:ext>
+    </p:extLst>
+  </p:cSld>
+  <p:clrMapOvr>
+    <a:masterClrMapping/>
+  </p:clrMapOvr>
+  <p:timing>
+    <p:tnLst>
+      <p:par>
+        <p:cTn id="1" dur="indefinite" restart="never" nodeType="tmRoot"/>
+      </p:par>
+    </p:tnLst>
+  </p:timing>
+</p:sld>
+</file>
+
+<file path=ppt/slides/slide6.xml><?xml version="1.0" encoding="utf-8"?>
+<p:sld xmlns:a="http://schemas.openxmlformats.org/drawingml/2006/main" xmlns:r="http://schemas.openxmlformats.org/officeDocument/2006/relationships" xmlns:p="http://schemas.openxmlformats.org/presentationml/2006/main">
+  <p:cSld>
+    <p:bg>
+      <p:bgPr>
+        <a:solidFill>
+          <a:schemeClr val="bg1">
+            <a:lumMod val="85000"/>
+            <a:alpha val="70000"/>
+          </a:schemeClr>
+        </a:solidFill>
+        <a:effectLst/>
+      </p:bgPr>
+    </p:bg>
+    <p:spTree>
+      <p:nvGrpSpPr>
+        <p:cNvPr id="1" name=""/>
+        <p:cNvGrpSpPr/>
+        <p:nvPr/>
+      </p:nvGrpSpPr>
+      <p:grpSpPr>
+        <a:xfrm>
+          <a:off x="0" y="0"/>
+          <a:ext cx="0" cy="0"/>
+          <a:chOff x="0" y="0"/>
+          <a:chExt cx="0" cy="0"/>
+        </a:xfrm>
+      </p:grpSpPr>
+      <p:pic>
+        <p:nvPicPr>
+          <p:cNvPr id="4" name="Imagem 3"/>
+          <p:cNvPicPr>
+            <a:picLocks noChangeAspect="1"/>
+          </p:cNvPicPr>
+          <p:nvPr/>
+        </p:nvPicPr>
+        <p:blipFill>
+          <a:blip r:embed="rId2" cstate="print">
+            <a:extLst>
+              <a:ext uri="{28A0092B-C50C-407E-A947-70E740481C1C}">
+                <a14:useLocalDpi xmlns:a14="http://schemas.microsoft.com/office/drawing/2010/main" val="0"/>
+              </a:ext>
+            </a:extLst>
+          </a:blip>
+          <a:stretch>
+            <a:fillRect/>
+          </a:stretch>
+        </p:blipFill>
+        <p:spPr>
+          <a:xfrm>
+            <a:off x="76611" y="271406"/>
+            <a:ext cx="1186172" cy="1260000"/>
+          </a:xfrm>
+          <a:prstGeom prst="rect">
+            <a:avLst/>
+          </a:prstGeom>
+        </p:spPr>
+      </p:pic>
+      <p:pic>
+        <p:nvPicPr>
+          <p:cNvPr id="5" name="Imagem 4"/>
+          <p:cNvPicPr>
+            <a:picLocks noChangeAspect="1"/>
+          </p:cNvPicPr>
+          <p:nvPr/>
+        </p:nvPicPr>
+        <p:blipFill>
+          <a:blip r:embed="rId3" cstate="print">
+            <a:extLst>
+              <a:ext uri="{28A0092B-C50C-407E-A947-70E740481C1C}">
+                <a14:useLocalDpi xmlns:a14="http://schemas.microsoft.com/office/drawing/2010/main" val="0"/>
+              </a:ext>
+            </a:extLst>
+          </a:blip>
+          <a:stretch>
+            <a:fillRect/>
+          </a:stretch>
+        </p:blipFill>
+        <p:spPr>
+          <a:xfrm>
+            <a:off x="5481557" y="143239"/>
+            <a:ext cx="1806020" cy="1080000"/>
+          </a:xfrm>
+          <a:prstGeom prst="rect">
+            <a:avLst/>
+          </a:prstGeom>
+        </p:spPr>
+      </p:pic>
+      <p:pic>
+        <p:nvPicPr>
+          <p:cNvPr id="7" name="Imagem 6"/>
+          <p:cNvPicPr>
+            <a:picLocks noChangeAspect="1"/>
+          </p:cNvPicPr>
+          <p:nvPr/>
+        </p:nvPicPr>
+        <p:blipFill>
+          <a:blip r:embed="rId4" cstate="print">
+            <a:extLst>
+              <a:ext uri="{28A0092B-C50C-407E-A947-70E740481C1C}">
+                <a14:useLocalDpi xmlns:a14="http://schemas.microsoft.com/office/drawing/2010/main" val="0"/>
+              </a:ext>
+            </a:extLst>
+          </a:blip>
+          <a:stretch>
+            <a:fillRect/>
+          </a:stretch>
+        </p:blipFill>
+        <p:spPr>
+          <a:xfrm>
+            <a:off x="5543075" y="2268671"/>
+            <a:ext cx="1682984" cy="1440000"/>
+          </a:xfrm>
+          <a:prstGeom prst="rect">
+            <a:avLst/>
+          </a:prstGeom>
+        </p:spPr>
+      </p:pic>
+      <p:pic>
+        <p:nvPicPr>
+          <p:cNvPr id="10" name="Imagem 9"/>
+          <p:cNvPicPr>
+            <a:picLocks noChangeAspect="1"/>
+          </p:cNvPicPr>
+          <p:nvPr/>
+        </p:nvPicPr>
+        <p:blipFill>
+          <a:blip r:embed="rId5" cstate="print">
+            <a:extLst>
+              <a:ext uri="{28A0092B-C50C-407E-A947-70E740481C1C}">
+                <a14:useLocalDpi xmlns:a14="http://schemas.microsoft.com/office/drawing/2010/main" val="0"/>
+              </a:ext>
+            </a:extLst>
+          </a:blip>
+          <a:stretch>
+            <a:fillRect/>
+          </a:stretch>
+        </p:blipFill>
+        <p:spPr>
+          <a:xfrm>
+            <a:off x="18684" y="2229483"/>
+            <a:ext cx="3801600" cy="1440000"/>
+          </a:xfrm>
+          <a:prstGeom prst="rect">
+            <a:avLst/>
+          </a:prstGeom>
+        </p:spPr>
+      </p:pic>
+      <p:grpSp>
+        <p:nvGrpSpPr>
+          <p:cNvPr id="54" name="Agrupar 53"/>
+          <p:cNvGrpSpPr/>
+          <p:nvPr/>
+        </p:nvGrpSpPr>
+        <p:grpSpPr>
+          <a:xfrm rot="1456573">
+            <a:off x="9680247" y="208324"/>
+            <a:ext cx="2564552" cy="2317849"/>
+            <a:chOff x="8159238" y="1647205"/>
+            <a:chExt cx="2564552" cy="2317849"/>
+          </a:xfrm>
+        </p:grpSpPr>
+        <p:pic>
+          <p:nvPicPr>
+            <p:cNvPr id="11" name="Imagem 10"/>
+            <p:cNvPicPr>
+              <a:picLocks noChangeAspect="1"/>
+            </p:cNvPicPr>
+            <p:nvPr/>
+          </p:nvPicPr>
+          <p:blipFill>
+            <a:blip r:embed="rId6" cstate="print">
+              <a:extLst>
+                <a:ext uri="{28A0092B-C50C-407E-A947-70E740481C1C}">
+                  <a14:useLocalDpi xmlns:a14="http://schemas.microsoft.com/office/drawing/2010/main" val="0"/>
+                </a:ext>
+              </a:extLst>
+            </a:blip>
+            <a:stretch>
+              <a:fillRect/>
+            </a:stretch>
+          </p:blipFill>
+          <p:spPr>
+            <a:xfrm rot="19998745">
+              <a:off x="9240528" y="2525054"/>
+              <a:ext cx="1483262" cy="1440000"/>
+            </a:xfrm>
+            <a:prstGeom prst="rect">
+              <a:avLst/>
+            </a:prstGeom>
+          </p:spPr>
+        </p:pic>
+        <p:pic>
+          <p:nvPicPr>
+            <p:cNvPr id="12" name="Imagem 11"/>
+            <p:cNvPicPr>
+              <a:picLocks noChangeAspect="1"/>
+            </p:cNvPicPr>
+            <p:nvPr/>
+          </p:nvPicPr>
+          <p:blipFill>
+            <a:blip r:embed="rId7" cstate="print">
+              <a:extLst>
+                <a:ext uri="{28A0092B-C50C-407E-A947-70E740481C1C}">
+                  <a14:useLocalDpi xmlns:a14="http://schemas.microsoft.com/office/drawing/2010/main" val="0"/>
+                </a:ext>
+              </a:extLst>
+            </a:blip>
+            <a:stretch>
+              <a:fillRect/>
+            </a:stretch>
+          </p:blipFill>
+          <p:spPr>
+            <a:xfrm>
+              <a:off x="8159238" y="1647205"/>
+              <a:ext cx="1484111" cy="1440000"/>
+            </a:xfrm>
+            <a:prstGeom prst="rect">
+              <a:avLst/>
+            </a:prstGeom>
+          </p:spPr>
+        </p:pic>
+      </p:grpSp>
+      <p:pic>
+        <p:nvPicPr>
+          <p:cNvPr id="13" name="Imagem 12"/>
+          <p:cNvPicPr>
+            <a:picLocks noChangeAspect="1"/>
+          </p:cNvPicPr>
+          <p:nvPr/>
+        </p:nvPicPr>
+        <p:blipFill>
+          <a:blip r:embed="rId8" cstate="print">
+            <a:extLst>
+              <a:ext uri="{28A0092B-C50C-407E-A947-70E740481C1C}">
+                <a14:useLocalDpi xmlns:a14="http://schemas.microsoft.com/office/drawing/2010/main" val="0"/>
+              </a:ext>
+            </a:extLst>
+          </a:blip>
+          <a:stretch>
+            <a:fillRect/>
+          </a:stretch>
+        </p:blipFill>
+        <p:spPr>
+          <a:xfrm>
+            <a:off x="367394" y="4796030"/>
+            <a:ext cx="2350682" cy="1440000"/>
+          </a:xfrm>
+          <a:prstGeom prst="rect">
+            <a:avLst/>
+          </a:prstGeom>
+        </p:spPr>
+      </p:pic>
+      <p:sp>
+        <p:nvSpPr>
+          <p:cNvPr id="15" name="CaixaDeTexto 14"/>
+          <p:cNvSpPr txBox="1"/>
+          <p:nvPr/>
+        </p:nvSpPr>
+        <p:spPr>
+          <a:xfrm>
+            <a:off x="1386651" y="561804"/>
+            <a:ext cx="2747440" cy="1200329"/>
+          </a:xfrm>
+          <a:prstGeom prst="rect">
+            <a:avLst/>
+          </a:prstGeom>
+          <a:noFill/>
+        </p:spPr>
+        <p:txBody>
+          <a:bodyPr wrap="square" rtlCol="0">
+            <a:spAutoFit/>
+          </a:bodyPr>
+          <a:lstStyle/>
+          <a:p>
+            <a:r>
+              <a:rPr lang="pt-BR" b="1" i="1" dirty="0">
+                <a:latin typeface="Roboto" panose="02000000000000000000" pitchFamily="2" charset="0"/>
+                <a:ea typeface="Roboto" panose="02000000000000000000" pitchFamily="2" charset="0"/>
+                <a:cs typeface="Roboto" panose="02000000000000000000" pitchFamily="2" charset="0"/>
+              </a:rPr>
+              <a:t>CALCULADORA E GERENCIADOR DE TAREFAS </a:t>
+            </a:r>
+            <a:r>
+              <a:rPr lang="pt-BR" i="1" dirty="0">
+                <a:latin typeface="Roboto" panose="02000000000000000000" pitchFamily="2" charset="0"/>
+                <a:ea typeface="Roboto" panose="02000000000000000000" pitchFamily="2" charset="0"/>
+                <a:cs typeface="Roboto" panose="02000000000000000000" pitchFamily="2" charset="0"/>
+              </a:rPr>
+              <a:t>COM ANGULAR 8</a:t>
+            </a:r>
+          </a:p>
+        </p:txBody>
+      </p:sp>
+      <p:sp>
+        <p:nvSpPr>
+          <p:cNvPr id="17" name="CaixaDeTexto 16"/>
+          <p:cNvSpPr txBox="1"/>
+          <p:nvPr/>
+        </p:nvSpPr>
+        <p:spPr>
+          <a:xfrm>
+            <a:off x="152152" y="3729869"/>
+            <a:ext cx="3257767" cy="923330"/>
+          </a:xfrm>
+          <a:prstGeom prst="rect">
+            <a:avLst/>
+          </a:prstGeom>
+          <a:noFill/>
+        </p:spPr>
+        <p:txBody>
+          <a:bodyPr wrap="square" rtlCol="0">
+            <a:spAutoFit/>
+          </a:bodyPr>
+          <a:lstStyle/>
+          <a:p>
+            <a:r>
+              <a:rPr lang="pt-BR" b="1" i="1" dirty="0">
+                <a:latin typeface="Roboto" panose="02000000000000000000" pitchFamily="2" charset="0"/>
+                <a:ea typeface="Roboto" panose="02000000000000000000" pitchFamily="2" charset="0"/>
+                <a:cs typeface="Roboto" panose="02000000000000000000" pitchFamily="2" charset="0"/>
+              </a:rPr>
+              <a:t>BUSCADOR DE REPOSITÓRIOS </a:t>
+            </a:r>
+            <a:r>
+              <a:rPr lang="pt-BR" i="1" dirty="0">
+                <a:latin typeface="Roboto" panose="02000000000000000000" pitchFamily="2" charset="0"/>
+                <a:ea typeface="Roboto" panose="02000000000000000000" pitchFamily="2" charset="0"/>
+                <a:cs typeface="Roboto" panose="02000000000000000000" pitchFamily="2" charset="0"/>
+              </a:rPr>
+              <a:t>COM HTML 5, CSS 3 E JAVASCRIPT</a:t>
+            </a:r>
+          </a:p>
+        </p:txBody>
+      </p:sp>
+      <p:sp>
+        <p:nvSpPr>
+          <p:cNvPr id="18" name="CaixaDeTexto 17"/>
+          <p:cNvSpPr txBox="1"/>
+          <p:nvPr/>
+        </p:nvSpPr>
+        <p:spPr>
+          <a:xfrm>
+            <a:off x="2058436" y="5912864"/>
+            <a:ext cx="2797511" cy="923330"/>
+          </a:xfrm>
+          <a:prstGeom prst="rect">
+            <a:avLst/>
+          </a:prstGeom>
+          <a:noFill/>
+        </p:spPr>
+        <p:txBody>
+          <a:bodyPr wrap="square" rtlCol="0">
+            <a:spAutoFit/>
+          </a:bodyPr>
+          <a:lstStyle/>
+          <a:p>
+            <a:r>
+              <a:rPr lang="pt-BR" b="1" i="1" dirty="0">
+                <a:latin typeface="Roboto" panose="02000000000000000000" pitchFamily="2" charset="0"/>
+                <a:ea typeface="Roboto" panose="02000000000000000000" pitchFamily="2" charset="0"/>
+                <a:cs typeface="Roboto" panose="02000000000000000000" pitchFamily="2" charset="0"/>
+              </a:rPr>
+              <a:t>API REST DE TERMOS ÚTEIS </a:t>
+            </a:r>
+            <a:r>
+              <a:rPr lang="pt-BR" i="1" dirty="0">
+                <a:latin typeface="Roboto" panose="02000000000000000000" pitchFamily="2" charset="0"/>
+                <a:ea typeface="Roboto" panose="02000000000000000000" pitchFamily="2" charset="0"/>
+                <a:cs typeface="Roboto" panose="02000000000000000000" pitchFamily="2" charset="0"/>
+              </a:rPr>
+              <a:t>COM NODEJS E MONGODB</a:t>
+            </a:r>
+          </a:p>
+        </p:txBody>
+      </p:sp>
+      <p:cxnSp>
+        <p:nvCxnSpPr>
+          <p:cNvPr id="23" name="Conector de Seta Reta 22"/>
+          <p:cNvCxnSpPr/>
+          <p:nvPr/>
+        </p:nvCxnSpPr>
+        <p:spPr>
+          <a:xfrm flipV="1">
+            <a:off x="3121159" y="3396343"/>
+            <a:ext cx="2234301" cy="1589213"/>
+          </a:xfrm>
+          <a:prstGeom prst="straightConnector1">
+            <a:avLst/>
+          </a:prstGeom>
+          <a:ln w="57150">
+            <a:solidFill>
+              <a:schemeClr val="tx1">
+                <a:lumMod val="50000"/>
+                <a:lumOff val="50000"/>
+              </a:schemeClr>
+            </a:solidFill>
+            <a:tailEnd type="triangle"/>
+          </a:ln>
+        </p:spPr>
+        <p:style>
+          <a:lnRef idx="1">
+            <a:schemeClr val="accent1"/>
+          </a:lnRef>
+          <a:fillRef idx="0">
+            <a:schemeClr val="accent1"/>
+          </a:fillRef>
+          <a:effectRef idx="0">
+            <a:schemeClr val="accent1"/>
+          </a:effectRef>
+          <a:fontRef idx="minor">
+            <a:schemeClr val="tx1"/>
+          </a:fontRef>
+        </p:style>
+      </p:cxnSp>
+      <p:cxnSp>
+        <p:nvCxnSpPr>
+          <p:cNvPr id="24" name="Conector de Seta Reta 23"/>
+          <p:cNvCxnSpPr/>
+          <p:nvPr/>
+        </p:nvCxnSpPr>
+        <p:spPr>
+          <a:xfrm>
+            <a:off x="3993894" y="2937626"/>
+            <a:ext cx="1432391" cy="13259"/>
+          </a:xfrm>
+          <a:prstGeom prst="straightConnector1">
+            <a:avLst/>
+          </a:prstGeom>
+          <a:ln w="57150">
+            <a:solidFill>
+              <a:schemeClr val="tx1">
+                <a:lumMod val="50000"/>
+                <a:lumOff val="50000"/>
+              </a:schemeClr>
+            </a:solidFill>
+            <a:tailEnd type="triangle"/>
+          </a:ln>
+        </p:spPr>
+        <p:style>
+          <a:lnRef idx="1">
+            <a:schemeClr val="accent1"/>
+          </a:lnRef>
+          <a:fillRef idx="0">
+            <a:schemeClr val="accent1"/>
+          </a:fillRef>
+          <a:effectRef idx="0">
+            <a:schemeClr val="accent1"/>
+          </a:effectRef>
+          <a:fontRef idx="minor">
+            <a:schemeClr val="tx1"/>
+          </a:fontRef>
+        </p:style>
+      </p:cxnSp>
+      <p:cxnSp>
+        <p:nvCxnSpPr>
+          <p:cNvPr id="28" name="Conector de Seta Reta 27"/>
+          <p:cNvCxnSpPr/>
+          <p:nvPr/>
+        </p:nvCxnSpPr>
+        <p:spPr>
+          <a:xfrm>
+            <a:off x="3401540" y="1289084"/>
+            <a:ext cx="2040142" cy="1227612"/>
+          </a:xfrm>
+          <a:prstGeom prst="straightConnector1">
+            <a:avLst/>
+          </a:prstGeom>
+          <a:ln w="57150">
+            <a:solidFill>
+              <a:schemeClr val="tx1">
+                <a:lumMod val="50000"/>
+                <a:lumOff val="50000"/>
+              </a:schemeClr>
+            </a:solidFill>
+            <a:tailEnd type="triangle"/>
+          </a:ln>
+        </p:spPr>
+        <p:style>
+          <a:lnRef idx="1">
+            <a:schemeClr val="accent1"/>
+          </a:lnRef>
+          <a:fillRef idx="0">
+            <a:schemeClr val="accent1"/>
+          </a:fillRef>
+          <a:effectRef idx="0">
+            <a:schemeClr val="accent1"/>
+          </a:effectRef>
+          <a:fontRef idx="minor">
+            <a:schemeClr val="tx1"/>
+          </a:fontRef>
+        </p:style>
+      </p:cxnSp>
+      <p:cxnSp>
+        <p:nvCxnSpPr>
+          <p:cNvPr id="55" name="Conector de Seta Reta 54"/>
+          <p:cNvCxnSpPr/>
+          <p:nvPr/>
+        </p:nvCxnSpPr>
+        <p:spPr>
+          <a:xfrm flipV="1">
+            <a:off x="7413674" y="1833564"/>
+            <a:ext cx="2652585" cy="783028"/>
+          </a:xfrm>
+          <a:prstGeom prst="straightConnector1">
+            <a:avLst/>
+          </a:prstGeom>
+          <a:ln w="57150">
+            <a:solidFill>
+              <a:schemeClr val="tx1">
+                <a:lumMod val="50000"/>
+                <a:lumOff val="50000"/>
+              </a:schemeClr>
+            </a:solidFill>
+            <a:tailEnd type="triangle"/>
+          </a:ln>
+        </p:spPr>
+        <p:style>
+          <a:lnRef idx="1">
+            <a:schemeClr val="accent1"/>
+          </a:lnRef>
+          <a:fillRef idx="0">
+            <a:schemeClr val="accent1"/>
+          </a:fillRef>
+          <a:effectRef idx="0">
+            <a:schemeClr val="accent1"/>
+          </a:effectRef>
+          <a:fontRef idx="minor">
+            <a:schemeClr val="tx1"/>
+          </a:fontRef>
+        </p:style>
+      </p:cxnSp>
+      <p:cxnSp>
+        <p:nvCxnSpPr>
+          <p:cNvPr id="63" name="Conector de Seta Reta 62"/>
+          <p:cNvCxnSpPr/>
+          <p:nvPr/>
+        </p:nvCxnSpPr>
+        <p:spPr>
+          <a:xfrm flipH="1" flipV="1">
+            <a:off x="7724953" y="488708"/>
+            <a:ext cx="1953121" cy="307066"/>
+          </a:xfrm>
+          <a:prstGeom prst="straightConnector1">
+            <a:avLst/>
+          </a:prstGeom>
+          <a:ln w="57150">
+            <a:solidFill>
+              <a:schemeClr val="tx1">
+                <a:lumMod val="50000"/>
+                <a:lumOff val="50000"/>
+              </a:schemeClr>
+            </a:solidFill>
+            <a:tailEnd type="triangle"/>
+          </a:ln>
+        </p:spPr>
+        <p:style>
+          <a:lnRef idx="1">
+            <a:schemeClr val="accent1"/>
+          </a:lnRef>
+          <a:fillRef idx="0">
+            <a:schemeClr val="accent1"/>
+          </a:fillRef>
+          <a:effectRef idx="0">
+            <a:schemeClr val="accent1"/>
+          </a:effectRef>
+          <a:fontRef idx="minor">
+            <a:schemeClr val="tx1"/>
+          </a:fontRef>
+        </p:style>
+      </p:cxnSp>
+      <p:sp>
+        <p:nvSpPr>
+          <p:cNvPr id="72" name="CaixaDeTexto 71"/>
+          <p:cNvSpPr txBox="1"/>
+          <p:nvPr/>
+        </p:nvSpPr>
+        <p:spPr>
+          <a:xfrm>
+            <a:off x="5943817" y="3964779"/>
+            <a:ext cx="454706" cy="523220"/>
+          </a:xfrm>
+          <a:prstGeom prst="rect">
+            <a:avLst/>
+          </a:prstGeom>
+          <a:noFill/>
+        </p:spPr>
+        <p:txBody>
+          <a:bodyPr wrap="square" rtlCol="0">
+            <a:spAutoFit/>
+          </a:bodyPr>
+          <a:lstStyle/>
+          <a:p>
+            <a:r>
+              <a:rPr lang="pt-BR" sz="2800" b="1" i="1" dirty="0">
+                <a:latin typeface="Roboto" panose="02000000000000000000" pitchFamily="2" charset="0"/>
+                <a:ea typeface="Roboto" panose="02000000000000000000" pitchFamily="2" charset="0"/>
+                <a:cs typeface="Roboto" panose="02000000000000000000" pitchFamily="2" charset="0"/>
+              </a:rPr>
+              <a:t>1</a:t>
+            </a:r>
+            <a:endParaRPr lang="pt-BR" b="1" i="1" dirty="0">
+              <a:latin typeface="Roboto" panose="02000000000000000000" pitchFamily="2" charset="0"/>
+              <a:ea typeface="Roboto" panose="02000000000000000000" pitchFamily="2" charset="0"/>
+              <a:cs typeface="Roboto" panose="02000000000000000000" pitchFamily="2" charset="0"/>
+            </a:endParaRPr>
+          </a:p>
+        </p:txBody>
+      </p:sp>
+      <p:sp>
+        <p:nvSpPr>
+          <p:cNvPr id="73" name="CaixaDeTexto 72"/>
+          <p:cNvSpPr txBox="1"/>
+          <p:nvPr/>
+        </p:nvSpPr>
+        <p:spPr>
+          <a:xfrm>
+            <a:off x="9100083" y="2156243"/>
+            <a:ext cx="454706" cy="523220"/>
+          </a:xfrm>
+          <a:prstGeom prst="rect">
+            <a:avLst/>
+          </a:prstGeom>
+          <a:noFill/>
+        </p:spPr>
+        <p:txBody>
+          <a:bodyPr wrap="square" rtlCol="0">
+            <a:spAutoFit/>
+          </a:bodyPr>
+          <a:lstStyle/>
+          <a:p>
+            <a:r>
+              <a:rPr lang="pt-BR" sz="2800" b="1" i="1" dirty="0">
+                <a:latin typeface="Roboto" panose="02000000000000000000" pitchFamily="2" charset="0"/>
+                <a:ea typeface="Roboto" panose="02000000000000000000" pitchFamily="2" charset="0"/>
+                <a:cs typeface="Roboto" panose="02000000000000000000" pitchFamily="2" charset="0"/>
+              </a:rPr>
+              <a:t>2</a:t>
+            </a:r>
+            <a:endParaRPr lang="pt-BR" b="1" i="1" dirty="0">
+              <a:latin typeface="Roboto" panose="02000000000000000000" pitchFamily="2" charset="0"/>
+              <a:ea typeface="Roboto" panose="02000000000000000000" pitchFamily="2" charset="0"/>
+              <a:cs typeface="Roboto" panose="02000000000000000000" pitchFamily="2" charset="0"/>
+            </a:endParaRPr>
+          </a:p>
+        </p:txBody>
+      </p:sp>
+      <p:sp>
+        <p:nvSpPr>
+          <p:cNvPr id="74" name="CaixaDeTexto 73"/>
+          <p:cNvSpPr txBox="1"/>
+          <p:nvPr/>
+        </p:nvSpPr>
+        <p:spPr>
+          <a:xfrm>
+            <a:off x="7505808" y="736754"/>
+            <a:ext cx="454706" cy="523220"/>
+          </a:xfrm>
+          <a:prstGeom prst="rect">
+            <a:avLst/>
+          </a:prstGeom>
+          <a:noFill/>
+        </p:spPr>
+        <p:txBody>
+          <a:bodyPr wrap="square" rtlCol="0">
+            <a:spAutoFit/>
+          </a:bodyPr>
+          <a:lstStyle/>
+          <a:p>
+            <a:r>
+              <a:rPr lang="pt-BR" sz="2800" b="1" i="1" dirty="0">
+                <a:latin typeface="Roboto" panose="02000000000000000000" pitchFamily="2" charset="0"/>
+                <a:ea typeface="Roboto" panose="02000000000000000000" pitchFamily="2" charset="0"/>
+                <a:cs typeface="Roboto" panose="02000000000000000000" pitchFamily="2" charset="0"/>
+              </a:rPr>
+              <a:t>3</a:t>
+            </a:r>
+            <a:endParaRPr lang="pt-BR" b="1" i="1" dirty="0">
+              <a:latin typeface="Roboto" panose="02000000000000000000" pitchFamily="2" charset="0"/>
+              <a:ea typeface="Roboto" panose="02000000000000000000" pitchFamily="2" charset="0"/>
+              <a:cs typeface="Roboto" panose="02000000000000000000" pitchFamily="2" charset="0"/>
+            </a:endParaRPr>
+          </a:p>
+        </p:txBody>
+      </p:sp>
+      <p:sp>
+        <p:nvSpPr>
+          <p:cNvPr id="77" name="CaixaDeTexto 76"/>
+          <p:cNvSpPr txBox="1"/>
+          <p:nvPr/>
+        </p:nvSpPr>
+        <p:spPr>
+          <a:xfrm>
+            <a:off x="8234903" y="2657909"/>
+            <a:ext cx="2185066" cy="1477328"/>
+          </a:xfrm>
+          <a:prstGeom prst="rect">
+            <a:avLst/>
+          </a:prstGeom>
+          <a:noFill/>
+        </p:spPr>
+        <p:txBody>
+          <a:bodyPr wrap="square" rtlCol="0">
+            <a:spAutoFit/>
+          </a:bodyPr>
+          <a:lstStyle/>
+          <a:p>
+            <a:r>
+              <a:rPr lang="pt-BR" i="1" dirty="0">
+                <a:latin typeface="Roboto" panose="02000000000000000000" pitchFamily="2" charset="0"/>
+                <a:ea typeface="Roboto" panose="02000000000000000000" pitchFamily="2" charset="0"/>
+                <a:cs typeface="Roboto" panose="02000000000000000000" pitchFamily="2" charset="0"/>
+              </a:rPr>
+              <a:t>OSQUESTRAÇÃO DOS CONTÊINERS </a:t>
+            </a:r>
+            <a:r>
+              <a:rPr lang="pt-BR" b="1" i="1" dirty="0">
+                <a:latin typeface="Roboto" panose="02000000000000000000" pitchFamily="2" charset="0"/>
+                <a:ea typeface="Roboto" panose="02000000000000000000" pitchFamily="2" charset="0"/>
+                <a:cs typeface="Roboto" panose="02000000000000000000" pitchFamily="2" charset="0"/>
+              </a:rPr>
+              <a:t>DOCKER </a:t>
+            </a:r>
+            <a:r>
+              <a:rPr lang="pt-BR" i="1" dirty="0">
+                <a:latin typeface="Roboto" panose="02000000000000000000" pitchFamily="2" charset="0"/>
+                <a:ea typeface="Roboto" panose="02000000000000000000" pitchFamily="2" charset="0"/>
+                <a:cs typeface="Roboto" panose="02000000000000000000" pitchFamily="2" charset="0"/>
+              </a:rPr>
+              <a:t>COM </a:t>
+            </a:r>
+            <a:r>
+              <a:rPr lang="pt-BR" b="1" i="1" dirty="0">
+                <a:latin typeface="Roboto" panose="02000000000000000000" pitchFamily="2" charset="0"/>
+                <a:ea typeface="Roboto" panose="02000000000000000000" pitchFamily="2" charset="0"/>
+                <a:cs typeface="Roboto" panose="02000000000000000000" pitchFamily="2" charset="0"/>
+              </a:rPr>
+              <a:t>KUBERNETES MINIKUBE</a:t>
+            </a:r>
+          </a:p>
+        </p:txBody>
+      </p:sp>
+      <p:sp>
+        <p:nvSpPr>
+          <p:cNvPr id="78" name="CaixaDeTexto 77"/>
+          <p:cNvSpPr txBox="1"/>
+          <p:nvPr/>
+        </p:nvSpPr>
+        <p:spPr>
+          <a:xfrm>
+            <a:off x="4927928" y="4531832"/>
+            <a:ext cx="2308631" cy="923330"/>
+          </a:xfrm>
+          <a:prstGeom prst="rect">
+            <a:avLst/>
+          </a:prstGeom>
+          <a:noFill/>
+        </p:spPr>
+        <p:txBody>
+          <a:bodyPr wrap="square" rtlCol="0">
+            <a:spAutoFit/>
+          </a:bodyPr>
+          <a:lstStyle/>
+          <a:p>
+            <a:r>
+              <a:rPr lang="pt-BR" i="1" dirty="0">
+                <a:latin typeface="Roboto" panose="02000000000000000000" pitchFamily="2" charset="0"/>
+                <a:ea typeface="Roboto" panose="02000000000000000000" pitchFamily="2" charset="0"/>
+                <a:cs typeface="Roboto" panose="02000000000000000000" pitchFamily="2" charset="0"/>
+              </a:rPr>
+              <a:t>CONTÊINERIZAÇÃO DAS 4 APLICAÇÕES COM </a:t>
+            </a:r>
+            <a:r>
+              <a:rPr lang="pt-BR" b="1" i="1" dirty="0">
+                <a:latin typeface="Roboto" panose="02000000000000000000" pitchFamily="2" charset="0"/>
+                <a:ea typeface="Roboto" panose="02000000000000000000" pitchFamily="2" charset="0"/>
+                <a:cs typeface="Roboto" panose="02000000000000000000" pitchFamily="2" charset="0"/>
+              </a:rPr>
+              <a:t>DOCKER</a:t>
+            </a:r>
+          </a:p>
+        </p:txBody>
+      </p:sp>
+      <p:sp>
+        <p:nvSpPr>
+          <p:cNvPr id="79" name="CaixaDeTexto 78"/>
+          <p:cNvSpPr txBox="1"/>
+          <p:nvPr/>
+        </p:nvSpPr>
+        <p:spPr>
+          <a:xfrm>
+            <a:off x="5235031" y="1348288"/>
+            <a:ext cx="2928952" cy="646331"/>
+          </a:xfrm>
+          <a:prstGeom prst="rect">
+            <a:avLst/>
+          </a:prstGeom>
+          <a:noFill/>
+        </p:spPr>
+        <p:txBody>
+          <a:bodyPr wrap="square" rtlCol="0">
+            <a:spAutoFit/>
+          </a:bodyPr>
+          <a:lstStyle/>
+          <a:p>
+            <a:r>
+              <a:rPr lang="pt-BR" i="1" dirty="0">
+                <a:latin typeface="Roboto" panose="02000000000000000000" pitchFamily="2" charset="0"/>
+                <a:ea typeface="Roboto" panose="02000000000000000000" pitchFamily="2" charset="0"/>
+                <a:cs typeface="Roboto" panose="02000000000000000000" pitchFamily="2" charset="0"/>
+              </a:rPr>
+              <a:t>DEPLOY DOS PODS NA </a:t>
+            </a:r>
+            <a:r>
+              <a:rPr lang="pt-BR" b="1" i="1" dirty="0">
+                <a:latin typeface="Roboto" panose="02000000000000000000" pitchFamily="2" charset="0"/>
+                <a:ea typeface="Roboto" panose="02000000000000000000" pitchFamily="2" charset="0"/>
+                <a:cs typeface="Roboto" panose="02000000000000000000" pitchFamily="2" charset="0"/>
+              </a:rPr>
+              <a:t>AMAZON WEB SERVICES</a:t>
+            </a:r>
+          </a:p>
+        </p:txBody>
+      </p:sp>
+      <p:pic>
+        <p:nvPicPr>
+          <p:cNvPr id="3" name="Imagem 2">
+            <a:extLst>
+              <a:ext uri="{FF2B5EF4-FFF2-40B4-BE49-F238E27FC236}">
+                <a16:creationId xmlns:a16="http://schemas.microsoft.com/office/drawing/2014/main" id="{10B15967-B736-4459-9A79-72CA7DBE35F4}"/>
+              </a:ext>
+            </a:extLst>
+          </p:cNvPr>
+          <p:cNvPicPr>
+            <a:picLocks noChangeAspect="1"/>
+          </p:cNvPicPr>
+          <p:nvPr/>
+        </p:nvPicPr>
+        <p:blipFill>
+          <a:blip r:embed="rId9" cstate="print">
+            <a:extLst>
+              <a:ext uri="{28A0092B-C50C-407E-A947-70E740481C1C}">
+                <a14:useLocalDpi xmlns:a14="http://schemas.microsoft.com/office/drawing/2010/main" val="0"/>
+              </a:ext>
+            </a:extLst>
+          </a:blip>
+          <a:stretch>
+            <a:fillRect/>
+          </a:stretch>
+        </p:blipFill>
+        <p:spPr>
+          <a:xfrm>
+            <a:off x="219831" y="6207572"/>
+            <a:ext cx="1796681" cy="485087"/>
+          </a:xfrm>
+          <a:prstGeom prst="rect">
+            <a:avLst/>
+          </a:prstGeom>
+        </p:spPr>
+      </p:pic>
+    </p:spTree>
+    <p:extLst>
+      <p:ext uri="{BB962C8B-B14F-4D97-AF65-F5344CB8AC3E}">
+        <p14:creationId xmlns:p14="http://schemas.microsoft.com/office/powerpoint/2010/main" val="1405442995"/>
+      </p:ext>
+    </p:extLst>
+  </p:cSld>
+  <p:clrMapOvr>
+    <a:masterClrMapping/>
+  </p:clrMapOvr>
+  <p:timing>
+    <p:tnLst>
+      <p:par>
+        <p:cTn id="1" dur="indefinite" restart="never" nodeType="tmRoot"/>
+      </p:par>
+    </p:tnLst>
+  </p:timing>
+</p:sld>
+</file>
+
+<file path=ppt/slides/slide7.xml><?xml version="1.0" encoding="utf-8"?>
+<p:sld xmlns:a="http://schemas.openxmlformats.org/drawingml/2006/main" xmlns:r="http://schemas.openxmlformats.org/officeDocument/2006/relationships" xmlns:p="http://schemas.openxmlformats.org/presentationml/2006/main">
+  <p:cSld>
+    <p:bg>
+      <p:bgPr>
+        <a:solidFill>
+          <a:schemeClr val="bg1">
+            <a:lumMod val="85000"/>
+            <a:alpha val="70000"/>
+          </a:schemeClr>
+        </a:solidFill>
+        <a:effectLst/>
+      </p:bgPr>
+    </p:bg>
+    <p:spTree>
+      <p:nvGrpSpPr>
+        <p:cNvPr id="1" name=""/>
+        <p:cNvGrpSpPr/>
+        <p:nvPr/>
+      </p:nvGrpSpPr>
+      <p:grpSpPr>
+        <a:xfrm>
+          <a:off x="0" y="0"/>
+          <a:ext cx="0" cy="0"/>
+          <a:chOff x="0" y="0"/>
+          <a:chExt cx="0" cy="0"/>
+        </a:xfrm>
+      </p:grpSpPr>
+      <p:pic>
+        <p:nvPicPr>
+          <p:cNvPr id="4" name="Imagem 3"/>
+          <p:cNvPicPr>
+            <a:picLocks noChangeAspect="1"/>
+          </p:cNvPicPr>
+          <p:nvPr/>
+        </p:nvPicPr>
+        <p:blipFill>
+          <a:blip r:embed="rId2" cstate="print">
+            <a:extLst>
+              <a:ext uri="{28A0092B-C50C-407E-A947-70E740481C1C}">
+                <a14:useLocalDpi xmlns:a14="http://schemas.microsoft.com/office/drawing/2010/main" val="0"/>
+              </a:ext>
+            </a:extLst>
+          </a:blip>
+          <a:stretch>
+            <a:fillRect/>
+          </a:stretch>
+        </p:blipFill>
+        <p:spPr>
+          <a:xfrm>
+            <a:off x="76611" y="271406"/>
+            <a:ext cx="1186172" cy="1260000"/>
+          </a:xfrm>
+          <a:prstGeom prst="rect">
+            <a:avLst/>
+          </a:prstGeom>
+        </p:spPr>
+      </p:pic>
+      <p:pic>
+        <p:nvPicPr>
+          <p:cNvPr id="5" name="Imagem 4"/>
+          <p:cNvPicPr>
+            <a:picLocks noChangeAspect="1"/>
+          </p:cNvPicPr>
+          <p:nvPr/>
+        </p:nvPicPr>
+        <p:blipFill>
+          <a:blip r:embed="rId3" cstate="print">
+            <a:extLst>
+              <a:ext uri="{28A0092B-C50C-407E-A947-70E740481C1C}">
+                <a14:useLocalDpi xmlns:a14="http://schemas.microsoft.com/office/drawing/2010/main" val="0"/>
+              </a:ext>
+            </a:extLst>
+          </a:blip>
+          <a:stretch>
+            <a:fillRect/>
+          </a:stretch>
+        </p:blipFill>
+        <p:spPr>
+          <a:xfrm>
+            <a:off x="5481557" y="143239"/>
+            <a:ext cx="1806020" cy="1080000"/>
+          </a:xfrm>
+          <a:prstGeom prst="rect">
+            <a:avLst/>
+          </a:prstGeom>
+        </p:spPr>
+      </p:pic>
+      <p:pic>
+        <p:nvPicPr>
+          <p:cNvPr id="7" name="Imagem 6"/>
+          <p:cNvPicPr>
+            <a:picLocks noChangeAspect="1"/>
+          </p:cNvPicPr>
+          <p:nvPr/>
+        </p:nvPicPr>
+        <p:blipFill>
+          <a:blip r:embed="rId4" cstate="print">
+            <a:extLst>
+              <a:ext uri="{28A0092B-C50C-407E-A947-70E740481C1C}">
+                <a14:useLocalDpi xmlns:a14="http://schemas.microsoft.com/office/drawing/2010/main" val="0"/>
+              </a:ext>
+            </a:extLst>
+          </a:blip>
+          <a:stretch>
+            <a:fillRect/>
+          </a:stretch>
+        </p:blipFill>
+        <p:spPr>
+          <a:xfrm>
+            <a:off x="5543075" y="2268671"/>
+            <a:ext cx="1682984" cy="1440000"/>
+          </a:xfrm>
+          <a:prstGeom prst="rect">
+            <a:avLst/>
+          </a:prstGeom>
+        </p:spPr>
+      </p:pic>
+      <p:pic>
+        <p:nvPicPr>
+          <p:cNvPr id="8" name="Imagem 7"/>
+          <p:cNvPicPr>
+            <a:picLocks noChangeAspect="1"/>
+          </p:cNvPicPr>
+          <p:nvPr/>
+        </p:nvPicPr>
+        <p:blipFill>
+          <a:blip r:embed="rId5">
+            <a:extLst>
+              <a:ext uri="{28A0092B-C50C-407E-A947-70E740481C1C}">
+                <a14:useLocalDpi xmlns:a14="http://schemas.microsoft.com/office/drawing/2010/main" val="0"/>
+              </a:ext>
+            </a:extLst>
+          </a:blip>
+          <a:stretch>
+            <a:fillRect/>
+          </a:stretch>
+        </p:blipFill>
+        <p:spPr>
+          <a:xfrm>
+            <a:off x="10066259" y="5106855"/>
+            <a:ext cx="1792531" cy="1440000"/>
+          </a:xfrm>
+          <a:prstGeom prst="rect">
+            <a:avLst/>
+          </a:prstGeom>
+        </p:spPr>
+      </p:pic>
+      <p:pic>
+        <p:nvPicPr>
+          <p:cNvPr id="10" name="Imagem 9"/>
+          <p:cNvPicPr>
+            <a:picLocks noChangeAspect="1"/>
+          </p:cNvPicPr>
+          <p:nvPr/>
+        </p:nvPicPr>
+        <p:blipFill>
+          <a:blip r:embed="rId6" cstate="print">
+            <a:extLst>
+              <a:ext uri="{28A0092B-C50C-407E-A947-70E740481C1C}">
+                <a14:useLocalDpi xmlns:a14="http://schemas.microsoft.com/office/drawing/2010/main" val="0"/>
+              </a:ext>
+            </a:extLst>
+          </a:blip>
+          <a:stretch>
+            <a:fillRect/>
+          </a:stretch>
+        </p:blipFill>
+        <p:spPr>
+          <a:xfrm>
+            <a:off x="18684" y="2229483"/>
+            <a:ext cx="3801600" cy="1440000"/>
+          </a:xfrm>
+          <a:prstGeom prst="rect">
+            <a:avLst/>
+          </a:prstGeom>
+        </p:spPr>
+      </p:pic>
+      <p:grpSp>
+        <p:nvGrpSpPr>
+          <p:cNvPr id="54" name="Agrupar 53"/>
+          <p:cNvGrpSpPr/>
+          <p:nvPr/>
+        </p:nvGrpSpPr>
+        <p:grpSpPr>
+          <a:xfrm rot="1456573">
+            <a:off x="9680247" y="208324"/>
+            <a:ext cx="2564552" cy="2317849"/>
+            <a:chOff x="8159238" y="1647205"/>
+            <a:chExt cx="2564552" cy="2317849"/>
+          </a:xfrm>
+        </p:grpSpPr>
+        <p:pic>
+          <p:nvPicPr>
+            <p:cNvPr id="11" name="Imagem 10"/>
+            <p:cNvPicPr>
+              <a:picLocks noChangeAspect="1"/>
+            </p:cNvPicPr>
+            <p:nvPr/>
+          </p:nvPicPr>
+          <p:blipFill>
+            <a:blip r:embed="rId7" cstate="print">
+              <a:extLst>
+                <a:ext uri="{28A0092B-C50C-407E-A947-70E740481C1C}">
+                  <a14:useLocalDpi xmlns:a14="http://schemas.microsoft.com/office/drawing/2010/main" val="0"/>
+                </a:ext>
+              </a:extLst>
+            </a:blip>
+            <a:stretch>
+              <a:fillRect/>
+            </a:stretch>
+          </p:blipFill>
+          <p:spPr>
+            <a:xfrm rot="19998745">
+              <a:off x="9240528" y="2525054"/>
+              <a:ext cx="1483262" cy="1440000"/>
+            </a:xfrm>
+            <a:prstGeom prst="rect">
+              <a:avLst/>
+            </a:prstGeom>
+          </p:spPr>
+        </p:pic>
+        <p:pic>
+          <p:nvPicPr>
+            <p:cNvPr id="12" name="Imagem 11"/>
+            <p:cNvPicPr>
+              <a:picLocks noChangeAspect="1"/>
+            </p:cNvPicPr>
+            <p:nvPr/>
+          </p:nvPicPr>
+          <p:blipFill>
+            <a:blip r:embed="rId8" cstate="print">
+              <a:extLst>
+                <a:ext uri="{28A0092B-C50C-407E-A947-70E740481C1C}">
+                  <a14:useLocalDpi xmlns:a14="http://schemas.microsoft.com/office/drawing/2010/main" val="0"/>
+                </a:ext>
+              </a:extLst>
+            </a:blip>
+            <a:stretch>
+              <a:fillRect/>
+            </a:stretch>
+          </p:blipFill>
+          <p:spPr>
+            <a:xfrm>
+              <a:off x="8159238" y="1647205"/>
+              <a:ext cx="1484111" cy="1440000"/>
+            </a:xfrm>
+            <a:prstGeom prst="rect">
+              <a:avLst/>
+            </a:prstGeom>
+          </p:spPr>
+        </p:pic>
+      </p:grpSp>
+      <p:pic>
+        <p:nvPicPr>
+          <p:cNvPr id="13" name="Imagem 12"/>
+          <p:cNvPicPr>
+            <a:picLocks noChangeAspect="1"/>
+          </p:cNvPicPr>
+          <p:nvPr/>
+        </p:nvPicPr>
+        <p:blipFill>
+          <a:blip r:embed="rId9" cstate="print">
+            <a:extLst>
+              <a:ext uri="{28A0092B-C50C-407E-A947-70E740481C1C}">
+                <a14:useLocalDpi xmlns:a14="http://schemas.microsoft.com/office/drawing/2010/main" val="0"/>
+              </a:ext>
+            </a:extLst>
+          </a:blip>
+          <a:stretch>
+            <a:fillRect/>
+          </a:stretch>
+        </p:blipFill>
+        <p:spPr>
+          <a:xfrm>
+            <a:off x="367394" y="4796030"/>
+            <a:ext cx="2350682" cy="1440000"/>
+          </a:xfrm>
+          <a:prstGeom prst="rect">
+            <a:avLst/>
+          </a:prstGeom>
+        </p:spPr>
+      </p:pic>
+      <p:sp>
+        <p:nvSpPr>
+          <p:cNvPr id="15" name="CaixaDeTexto 14"/>
+          <p:cNvSpPr txBox="1"/>
+          <p:nvPr/>
+        </p:nvSpPr>
+        <p:spPr>
+          <a:xfrm>
+            <a:off x="1386651" y="561804"/>
+            <a:ext cx="2747440" cy="1200329"/>
+          </a:xfrm>
+          <a:prstGeom prst="rect">
+            <a:avLst/>
+          </a:prstGeom>
+          <a:noFill/>
+        </p:spPr>
+        <p:txBody>
+          <a:bodyPr wrap="square" rtlCol="0">
+            <a:spAutoFit/>
+          </a:bodyPr>
+          <a:lstStyle/>
+          <a:p>
+            <a:r>
+              <a:rPr lang="pt-BR" b="1" i="1" dirty="0">
+                <a:latin typeface="Roboto" panose="02000000000000000000" pitchFamily="2" charset="0"/>
+                <a:ea typeface="Roboto" panose="02000000000000000000" pitchFamily="2" charset="0"/>
+                <a:cs typeface="Roboto" panose="02000000000000000000" pitchFamily="2" charset="0"/>
+              </a:rPr>
+              <a:t>CALCULADORA E GERENCIADOR DE TAREFAS </a:t>
+            </a:r>
+            <a:r>
+              <a:rPr lang="pt-BR" i="1" dirty="0">
+                <a:latin typeface="Roboto" panose="02000000000000000000" pitchFamily="2" charset="0"/>
+                <a:ea typeface="Roboto" panose="02000000000000000000" pitchFamily="2" charset="0"/>
+                <a:cs typeface="Roboto" panose="02000000000000000000" pitchFamily="2" charset="0"/>
+              </a:rPr>
+              <a:t>COM ANGULAR 8</a:t>
+            </a:r>
+          </a:p>
+        </p:txBody>
+      </p:sp>
+      <p:sp>
+        <p:nvSpPr>
+          <p:cNvPr id="17" name="CaixaDeTexto 16"/>
+          <p:cNvSpPr txBox="1"/>
+          <p:nvPr/>
+        </p:nvSpPr>
+        <p:spPr>
+          <a:xfrm>
+            <a:off x="152152" y="3729869"/>
+            <a:ext cx="3257767" cy="923330"/>
+          </a:xfrm>
+          <a:prstGeom prst="rect">
+            <a:avLst/>
+          </a:prstGeom>
+          <a:noFill/>
+        </p:spPr>
+        <p:txBody>
+          <a:bodyPr wrap="square" rtlCol="0">
+            <a:spAutoFit/>
+          </a:bodyPr>
+          <a:lstStyle/>
+          <a:p>
+            <a:r>
+              <a:rPr lang="pt-BR" b="1" i="1" dirty="0">
+                <a:latin typeface="Roboto" panose="02000000000000000000" pitchFamily="2" charset="0"/>
+                <a:ea typeface="Roboto" panose="02000000000000000000" pitchFamily="2" charset="0"/>
+                <a:cs typeface="Roboto" panose="02000000000000000000" pitchFamily="2" charset="0"/>
+              </a:rPr>
+              <a:t>BUSCADOR DE REPOSITÓRIOS </a:t>
+            </a:r>
+            <a:r>
+              <a:rPr lang="pt-BR" i="1" dirty="0">
+                <a:latin typeface="Roboto" panose="02000000000000000000" pitchFamily="2" charset="0"/>
+                <a:ea typeface="Roboto" panose="02000000000000000000" pitchFamily="2" charset="0"/>
+                <a:cs typeface="Roboto" panose="02000000000000000000" pitchFamily="2" charset="0"/>
+              </a:rPr>
+              <a:t>COM HTML 5, CSS 3 E JAVASCRIPT</a:t>
+            </a:r>
+          </a:p>
+        </p:txBody>
+      </p:sp>
+      <p:sp>
+        <p:nvSpPr>
+          <p:cNvPr id="18" name="CaixaDeTexto 17"/>
+          <p:cNvSpPr txBox="1"/>
+          <p:nvPr/>
+        </p:nvSpPr>
+        <p:spPr>
+          <a:xfrm>
+            <a:off x="2058436" y="5912864"/>
+            <a:ext cx="2797511" cy="923330"/>
+          </a:xfrm>
+          <a:prstGeom prst="rect">
+            <a:avLst/>
+          </a:prstGeom>
+          <a:noFill/>
+        </p:spPr>
+        <p:txBody>
+          <a:bodyPr wrap="square" rtlCol="0">
+            <a:spAutoFit/>
+          </a:bodyPr>
+          <a:lstStyle/>
+          <a:p>
+            <a:r>
+              <a:rPr lang="pt-BR" b="1" i="1" dirty="0">
+                <a:latin typeface="Roboto" panose="02000000000000000000" pitchFamily="2" charset="0"/>
+                <a:ea typeface="Roboto" panose="02000000000000000000" pitchFamily="2" charset="0"/>
+                <a:cs typeface="Roboto" panose="02000000000000000000" pitchFamily="2" charset="0"/>
+              </a:rPr>
+              <a:t>API REST DE TERMOS ÚTEIS </a:t>
+            </a:r>
+            <a:r>
+              <a:rPr lang="pt-BR" i="1" dirty="0">
+                <a:latin typeface="Roboto" panose="02000000000000000000" pitchFamily="2" charset="0"/>
+                <a:ea typeface="Roboto" panose="02000000000000000000" pitchFamily="2" charset="0"/>
+                <a:cs typeface="Roboto" panose="02000000000000000000" pitchFamily="2" charset="0"/>
+              </a:rPr>
+              <a:t>COM NODEJS E MONGODB</a:t>
+            </a:r>
+          </a:p>
+        </p:txBody>
+      </p:sp>
+      <p:cxnSp>
+        <p:nvCxnSpPr>
+          <p:cNvPr id="23" name="Conector de Seta Reta 22"/>
+          <p:cNvCxnSpPr/>
+          <p:nvPr/>
+        </p:nvCxnSpPr>
+        <p:spPr>
+          <a:xfrm flipV="1">
+            <a:off x="3121159" y="3396343"/>
+            <a:ext cx="2234301" cy="1589213"/>
+          </a:xfrm>
+          <a:prstGeom prst="straightConnector1">
+            <a:avLst/>
+          </a:prstGeom>
+          <a:ln w="57150">
+            <a:solidFill>
+              <a:schemeClr val="tx1">
+                <a:lumMod val="50000"/>
+                <a:lumOff val="50000"/>
+              </a:schemeClr>
+            </a:solidFill>
+            <a:tailEnd type="triangle"/>
+          </a:ln>
+        </p:spPr>
+        <p:style>
+          <a:lnRef idx="1">
+            <a:schemeClr val="accent1"/>
+          </a:lnRef>
+          <a:fillRef idx="0">
+            <a:schemeClr val="accent1"/>
+          </a:fillRef>
+          <a:effectRef idx="0">
+            <a:schemeClr val="accent1"/>
+          </a:effectRef>
+          <a:fontRef idx="minor">
+            <a:schemeClr val="tx1"/>
+          </a:fontRef>
+        </p:style>
+      </p:cxnSp>
+      <p:cxnSp>
+        <p:nvCxnSpPr>
+          <p:cNvPr id="24" name="Conector de Seta Reta 23"/>
+          <p:cNvCxnSpPr/>
+          <p:nvPr/>
+        </p:nvCxnSpPr>
+        <p:spPr>
+          <a:xfrm>
+            <a:off x="3993894" y="2937626"/>
+            <a:ext cx="1432391" cy="13259"/>
+          </a:xfrm>
+          <a:prstGeom prst="straightConnector1">
+            <a:avLst/>
+          </a:prstGeom>
+          <a:ln w="57150">
+            <a:solidFill>
+              <a:schemeClr val="tx1">
+                <a:lumMod val="50000"/>
+                <a:lumOff val="50000"/>
+              </a:schemeClr>
+            </a:solidFill>
+            <a:tailEnd type="triangle"/>
+          </a:ln>
+        </p:spPr>
+        <p:style>
+          <a:lnRef idx="1">
+            <a:schemeClr val="accent1"/>
+          </a:lnRef>
+          <a:fillRef idx="0">
+            <a:schemeClr val="accent1"/>
+          </a:fillRef>
+          <a:effectRef idx="0">
+            <a:schemeClr val="accent1"/>
+          </a:effectRef>
+          <a:fontRef idx="minor">
+            <a:schemeClr val="tx1"/>
+          </a:fontRef>
+        </p:style>
+      </p:cxnSp>
+      <p:cxnSp>
+        <p:nvCxnSpPr>
+          <p:cNvPr id="28" name="Conector de Seta Reta 27"/>
+          <p:cNvCxnSpPr/>
+          <p:nvPr/>
+        </p:nvCxnSpPr>
+        <p:spPr>
+          <a:xfrm>
+            <a:off x="3401540" y="1289084"/>
+            <a:ext cx="2040142" cy="1227612"/>
+          </a:xfrm>
+          <a:prstGeom prst="straightConnector1">
+            <a:avLst/>
+          </a:prstGeom>
+          <a:ln w="57150">
+            <a:solidFill>
+              <a:schemeClr val="tx1">
+                <a:lumMod val="50000"/>
+                <a:lumOff val="50000"/>
+              </a:schemeClr>
+            </a:solidFill>
+            <a:tailEnd type="triangle"/>
+          </a:ln>
+        </p:spPr>
+        <p:style>
+          <a:lnRef idx="1">
+            <a:schemeClr val="accent1"/>
+          </a:lnRef>
+          <a:fillRef idx="0">
+            <a:schemeClr val="accent1"/>
+          </a:fillRef>
+          <a:effectRef idx="0">
+            <a:schemeClr val="accent1"/>
+          </a:effectRef>
+          <a:fontRef idx="minor">
+            <a:schemeClr val="tx1"/>
+          </a:fontRef>
+        </p:style>
+      </p:cxnSp>
+      <p:cxnSp>
+        <p:nvCxnSpPr>
+          <p:cNvPr id="55" name="Conector de Seta Reta 54"/>
+          <p:cNvCxnSpPr/>
+          <p:nvPr/>
+        </p:nvCxnSpPr>
+        <p:spPr>
+          <a:xfrm flipV="1">
+            <a:off x="7413674" y="1833564"/>
+            <a:ext cx="2652585" cy="783028"/>
+          </a:xfrm>
+          <a:prstGeom prst="straightConnector1">
+            <a:avLst/>
+          </a:prstGeom>
+          <a:ln w="57150">
+            <a:solidFill>
+              <a:schemeClr val="tx1">
+                <a:lumMod val="50000"/>
+                <a:lumOff val="50000"/>
+              </a:schemeClr>
+            </a:solidFill>
+            <a:tailEnd type="triangle"/>
+          </a:ln>
+        </p:spPr>
+        <p:style>
+          <a:lnRef idx="1">
+            <a:schemeClr val="accent1"/>
+          </a:lnRef>
+          <a:fillRef idx="0">
+            <a:schemeClr val="accent1"/>
+          </a:fillRef>
+          <a:effectRef idx="0">
+            <a:schemeClr val="accent1"/>
+          </a:effectRef>
+          <a:fontRef idx="minor">
+            <a:schemeClr val="tx1"/>
+          </a:fontRef>
+        </p:style>
+      </p:cxnSp>
+      <p:cxnSp>
+        <p:nvCxnSpPr>
+          <p:cNvPr id="63" name="Conector de Seta Reta 62"/>
+          <p:cNvCxnSpPr/>
+          <p:nvPr/>
+        </p:nvCxnSpPr>
+        <p:spPr>
+          <a:xfrm flipH="1" flipV="1">
+            <a:off x="7724953" y="488708"/>
+            <a:ext cx="1953121" cy="307066"/>
+          </a:xfrm>
+          <a:prstGeom prst="straightConnector1">
+            <a:avLst/>
+          </a:prstGeom>
+          <a:ln w="57150">
+            <a:solidFill>
+              <a:schemeClr val="tx1">
+                <a:lumMod val="50000"/>
+                <a:lumOff val="50000"/>
+              </a:schemeClr>
+            </a:solidFill>
+            <a:tailEnd type="triangle"/>
+          </a:ln>
+        </p:spPr>
+        <p:style>
+          <a:lnRef idx="1">
+            <a:schemeClr val="accent1"/>
+          </a:lnRef>
+          <a:fillRef idx="0">
+            <a:schemeClr val="accent1"/>
+          </a:fillRef>
+          <a:effectRef idx="0">
+            <a:schemeClr val="accent1"/>
+          </a:effectRef>
+          <a:fontRef idx="minor">
+            <a:schemeClr val="tx1"/>
+          </a:fontRef>
+        </p:style>
+      </p:cxnSp>
+      <p:sp>
+        <p:nvSpPr>
+          <p:cNvPr id="72" name="CaixaDeTexto 71"/>
+          <p:cNvSpPr txBox="1"/>
+          <p:nvPr/>
+        </p:nvSpPr>
+        <p:spPr>
+          <a:xfrm>
+            <a:off x="5943817" y="3964779"/>
+            <a:ext cx="454706" cy="523220"/>
+          </a:xfrm>
+          <a:prstGeom prst="rect">
+            <a:avLst/>
+          </a:prstGeom>
+          <a:noFill/>
+        </p:spPr>
+        <p:txBody>
+          <a:bodyPr wrap="square" rtlCol="0">
+            <a:spAutoFit/>
+          </a:bodyPr>
+          <a:lstStyle/>
+          <a:p>
+            <a:r>
+              <a:rPr lang="pt-BR" sz="2800" b="1" i="1" dirty="0">
+                <a:latin typeface="Roboto" panose="02000000000000000000" pitchFamily="2" charset="0"/>
+                <a:ea typeface="Roboto" panose="02000000000000000000" pitchFamily="2" charset="0"/>
+                <a:cs typeface="Roboto" panose="02000000000000000000" pitchFamily="2" charset="0"/>
+              </a:rPr>
+              <a:t>1</a:t>
+            </a:r>
+            <a:endParaRPr lang="pt-BR" b="1" i="1" dirty="0">
+              <a:latin typeface="Roboto" panose="02000000000000000000" pitchFamily="2" charset="0"/>
+              <a:ea typeface="Roboto" panose="02000000000000000000" pitchFamily="2" charset="0"/>
+              <a:cs typeface="Roboto" panose="02000000000000000000" pitchFamily="2" charset="0"/>
+            </a:endParaRPr>
+          </a:p>
+        </p:txBody>
+      </p:sp>
+      <p:sp>
+        <p:nvSpPr>
+          <p:cNvPr id="73" name="CaixaDeTexto 72"/>
+          <p:cNvSpPr txBox="1"/>
+          <p:nvPr/>
+        </p:nvSpPr>
+        <p:spPr>
+          <a:xfrm>
+            <a:off x="9100083" y="2156243"/>
+            <a:ext cx="454706" cy="523220"/>
+          </a:xfrm>
+          <a:prstGeom prst="rect">
+            <a:avLst/>
+          </a:prstGeom>
+          <a:noFill/>
+        </p:spPr>
+        <p:txBody>
+          <a:bodyPr wrap="square" rtlCol="0">
+            <a:spAutoFit/>
+          </a:bodyPr>
+          <a:lstStyle/>
+          <a:p>
+            <a:r>
+              <a:rPr lang="pt-BR" sz="2800" b="1" i="1" dirty="0">
+                <a:latin typeface="Roboto" panose="02000000000000000000" pitchFamily="2" charset="0"/>
+                <a:ea typeface="Roboto" panose="02000000000000000000" pitchFamily="2" charset="0"/>
+                <a:cs typeface="Roboto" panose="02000000000000000000" pitchFamily="2" charset="0"/>
+              </a:rPr>
+              <a:t>2</a:t>
+            </a:r>
+            <a:endParaRPr lang="pt-BR" b="1" i="1" dirty="0">
+              <a:latin typeface="Roboto" panose="02000000000000000000" pitchFamily="2" charset="0"/>
+              <a:ea typeface="Roboto" panose="02000000000000000000" pitchFamily="2" charset="0"/>
+              <a:cs typeface="Roboto" panose="02000000000000000000" pitchFamily="2" charset="0"/>
+            </a:endParaRPr>
+          </a:p>
+        </p:txBody>
+      </p:sp>
+      <p:sp>
+        <p:nvSpPr>
+          <p:cNvPr id="74" name="CaixaDeTexto 73"/>
+          <p:cNvSpPr txBox="1"/>
+          <p:nvPr/>
+        </p:nvSpPr>
+        <p:spPr>
+          <a:xfrm>
+            <a:off x="7505808" y="736754"/>
+            <a:ext cx="454706" cy="523220"/>
+          </a:xfrm>
+          <a:prstGeom prst="rect">
+            <a:avLst/>
+          </a:prstGeom>
+          <a:noFill/>
+        </p:spPr>
+        <p:txBody>
+          <a:bodyPr wrap="square" rtlCol="0">
+            <a:spAutoFit/>
+          </a:bodyPr>
+          <a:lstStyle/>
+          <a:p>
+            <a:r>
+              <a:rPr lang="pt-BR" sz="2800" b="1" i="1" dirty="0">
+                <a:latin typeface="Roboto" panose="02000000000000000000" pitchFamily="2" charset="0"/>
+                <a:ea typeface="Roboto" panose="02000000000000000000" pitchFamily="2" charset="0"/>
+                <a:cs typeface="Roboto" panose="02000000000000000000" pitchFamily="2" charset="0"/>
+              </a:rPr>
+              <a:t>3</a:t>
+            </a:r>
+            <a:endParaRPr lang="pt-BR" b="1" i="1" dirty="0">
+              <a:latin typeface="Roboto" panose="02000000000000000000" pitchFamily="2" charset="0"/>
+              <a:ea typeface="Roboto" panose="02000000000000000000" pitchFamily="2" charset="0"/>
+              <a:cs typeface="Roboto" panose="02000000000000000000" pitchFamily="2" charset="0"/>
+            </a:endParaRPr>
+          </a:p>
+        </p:txBody>
+      </p:sp>
+      <p:sp>
+        <p:nvSpPr>
+          <p:cNvPr id="75" name="CaixaDeTexto 74"/>
+          <p:cNvSpPr txBox="1"/>
+          <p:nvPr/>
+        </p:nvSpPr>
+        <p:spPr>
+          <a:xfrm>
+            <a:off x="11395633" y="3111520"/>
+            <a:ext cx="454706" cy="523220"/>
+          </a:xfrm>
+          <a:prstGeom prst="rect">
+            <a:avLst/>
+          </a:prstGeom>
+          <a:noFill/>
+        </p:spPr>
+        <p:txBody>
+          <a:bodyPr wrap="square" rtlCol="0">
+            <a:spAutoFit/>
+          </a:bodyPr>
+          <a:lstStyle/>
+          <a:p>
+            <a:r>
+              <a:rPr lang="pt-BR" sz="2800" b="1" i="1" dirty="0">
+                <a:latin typeface="Roboto" panose="02000000000000000000" pitchFamily="2" charset="0"/>
+                <a:ea typeface="Roboto" panose="02000000000000000000" pitchFamily="2" charset="0"/>
+                <a:cs typeface="Roboto" panose="02000000000000000000" pitchFamily="2" charset="0"/>
+              </a:rPr>
+              <a:t>4</a:t>
+            </a:r>
+            <a:endParaRPr lang="pt-BR" b="1" i="1" dirty="0">
+              <a:latin typeface="Roboto" panose="02000000000000000000" pitchFamily="2" charset="0"/>
+              <a:ea typeface="Roboto" panose="02000000000000000000" pitchFamily="2" charset="0"/>
+              <a:cs typeface="Roboto" panose="02000000000000000000" pitchFamily="2" charset="0"/>
+            </a:endParaRPr>
+          </a:p>
+        </p:txBody>
+      </p:sp>
+      <p:sp>
+        <p:nvSpPr>
+          <p:cNvPr id="77" name="CaixaDeTexto 76"/>
+          <p:cNvSpPr txBox="1"/>
+          <p:nvPr/>
+        </p:nvSpPr>
+        <p:spPr>
+          <a:xfrm>
+            <a:off x="8234903" y="2657909"/>
+            <a:ext cx="2185066" cy="1477328"/>
+          </a:xfrm>
+          <a:prstGeom prst="rect">
+            <a:avLst/>
+          </a:prstGeom>
+          <a:noFill/>
+        </p:spPr>
+        <p:txBody>
+          <a:bodyPr wrap="square" rtlCol="0">
+            <a:spAutoFit/>
+          </a:bodyPr>
+          <a:lstStyle/>
+          <a:p>
+            <a:r>
+              <a:rPr lang="pt-BR" i="1" dirty="0">
+                <a:latin typeface="Roboto" panose="02000000000000000000" pitchFamily="2" charset="0"/>
+                <a:ea typeface="Roboto" panose="02000000000000000000" pitchFamily="2" charset="0"/>
+                <a:cs typeface="Roboto" panose="02000000000000000000" pitchFamily="2" charset="0"/>
+              </a:rPr>
+              <a:t>OSQUESTRAÇÃO DOS CONTÊINERS </a:t>
+            </a:r>
+            <a:r>
+              <a:rPr lang="pt-BR" b="1" i="1" dirty="0">
+                <a:latin typeface="Roboto" panose="02000000000000000000" pitchFamily="2" charset="0"/>
+                <a:ea typeface="Roboto" panose="02000000000000000000" pitchFamily="2" charset="0"/>
+                <a:cs typeface="Roboto" panose="02000000000000000000" pitchFamily="2" charset="0"/>
+              </a:rPr>
+              <a:t>DOCKER </a:t>
+            </a:r>
+            <a:r>
+              <a:rPr lang="pt-BR" i="1" dirty="0">
+                <a:latin typeface="Roboto" panose="02000000000000000000" pitchFamily="2" charset="0"/>
+                <a:ea typeface="Roboto" panose="02000000000000000000" pitchFamily="2" charset="0"/>
+                <a:cs typeface="Roboto" panose="02000000000000000000" pitchFamily="2" charset="0"/>
+              </a:rPr>
+              <a:t>COM </a:t>
+            </a:r>
+            <a:r>
+              <a:rPr lang="pt-BR" b="1" i="1" dirty="0">
+                <a:latin typeface="Roboto" panose="02000000000000000000" pitchFamily="2" charset="0"/>
+                <a:ea typeface="Roboto" panose="02000000000000000000" pitchFamily="2" charset="0"/>
+                <a:cs typeface="Roboto" panose="02000000000000000000" pitchFamily="2" charset="0"/>
+              </a:rPr>
+              <a:t>KUBERNETES MINIKUBE</a:t>
+            </a:r>
+          </a:p>
+        </p:txBody>
+      </p:sp>
+      <p:sp>
+        <p:nvSpPr>
+          <p:cNvPr id="78" name="CaixaDeTexto 77"/>
+          <p:cNvSpPr txBox="1"/>
+          <p:nvPr/>
+        </p:nvSpPr>
+        <p:spPr>
+          <a:xfrm>
+            <a:off x="4927928" y="4531832"/>
+            <a:ext cx="2308631" cy="923330"/>
+          </a:xfrm>
+          <a:prstGeom prst="rect">
+            <a:avLst/>
+          </a:prstGeom>
+          <a:noFill/>
+        </p:spPr>
+        <p:txBody>
+          <a:bodyPr wrap="square" rtlCol="0">
+            <a:spAutoFit/>
+          </a:bodyPr>
+          <a:lstStyle/>
+          <a:p>
+            <a:r>
+              <a:rPr lang="pt-BR" i="1" dirty="0">
+                <a:latin typeface="Roboto" panose="02000000000000000000" pitchFamily="2" charset="0"/>
+                <a:ea typeface="Roboto" panose="02000000000000000000" pitchFamily="2" charset="0"/>
+                <a:cs typeface="Roboto" panose="02000000000000000000" pitchFamily="2" charset="0"/>
+              </a:rPr>
+              <a:t>CONTÊINERIZAÇÃO DAS 4 APLICAÇÕES COM </a:t>
+            </a:r>
+            <a:r>
+              <a:rPr lang="pt-BR" b="1" i="1" dirty="0">
+                <a:latin typeface="Roboto" panose="02000000000000000000" pitchFamily="2" charset="0"/>
+                <a:ea typeface="Roboto" panose="02000000000000000000" pitchFamily="2" charset="0"/>
+                <a:cs typeface="Roboto" panose="02000000000000000000" pitchFamily="2" charset="0"/>
+              </a:rPr>
+              <a:t>DOCKER</a:t>
+            </a:r>
+          </a:p>
+        </p:txBody>
+      </p:sp>
+      <p:sp>
+        <p:nvSpPr>
+          <p:cNvPr id="79" name="CaixaDeTexto 78"/>
+          <p:cNvSpPr txBox="1"/>
+          <p:nvPr/>
+        </p:nvSpPr>
+        <p:spPr>
+          <a:xfrm>
+            <a:off x="5235031" y="1348288"/>
+            <a:ext cx="2928952" cy="646331"/>
+          </a:xfrm>
+          <a:prstGeom prst="rect">
+            <a:avLst/>
+          </a:prstGeom>
+          <a:noFill/>
+        </p:spPr>
+        <p:txBody>
+          <a:bodyPr wrap="square" rtlCol="0">
+            <a:spAutoFit/>
+          </a:bodyPr>
+          <a:lstStyle/>
+          <a:p>
+            <a:r>
+              <a:rPr lang="pt-BR" i="1" dirty="0">
+                <a:latin typeface="Roboto" panose="02000000000000000000" pitchFamily="2" charset="0"/>
+                <a:ea typeface="Roboto" panose="02000000000000000000" pitchFamily="2" charset="0"/>
+                <a:cs typeface="Roboto" panose="02000000000000000000" pitchFamily="2" charset="0"/>
+              </a:rPr>
+              <a:t>DEPLOY DOS PODS NA </a:t>
+            </a:r>
+            <a:r>
+              <a:rPr lang="pt-BR" b="1" i="1" dirty="0">
+                <a:latin typeface="Roboto" panose="02000000000000000000" pitchFamily="2" charset="0"/>
+                <a:ea typeface="Roboto" panose="02000000000000000000" pitchFamily="2" charset="0"/>
+                <a:cs typeface="Roboto" panose="02000000000000000000" pitchFamily="2" charset="0"/>
+              </a:rPr>
+              <a:t>AMAZON WEB SERVICES</a:t>
+            </a:r>
+          </a:p>
+        </p:txBody>
+      </p:sp>
+      <p:sp>
+        <p:nvSpPr>
+          <p:cNvPr id="86" name="CaixaDeTexto 85"/>
+          <p:cNvSpPr txBox="1"/>
+          <p:nvPr/>
+        </p:nvSpPr>
+        <p:spPr>
+          <a:xfrm>
+            <a:off x="10067858" y="4026334"/>
+            <a:ext cx="1980450" cy="923330"/>
+          </a:xfrm>
+          <a:prstGeom prst="rect">
+            <a:avLst/>
+          </a:prstGeom>
+          <a:noFill/>
+        </p:spPr>
+        <p:txBody>
+          <a:bodyPr wrap="square" rtlCol="0">
+            <a:spAutoFit/>
+          </a:bodyPr>
+          <a:lstStyle/>
+          <a:p>
+            <a:r>
+              <a:rPr lang="pt-BR" i="1" dirty="0" smtClean="0">
+                <a:latin typeface="Roboto" panose="02000000000000000000" pitchFamily="2" charset="0"/>
+                <a:ea typeface="Roboto" panose="02000000000000000000" pitchFamily="2" charset="0"/>
+                <a:cs typeface="Roboto" panose="02000000000000000000" pitchFamily="2" charset="0"/>
+              </a:rPr>
+              <a:t>ATAQUE </a:t>
+            </a:r>
+            <a:r>
+              <a:rPr lang="pt-BR" i="1" dirty="0">
+                <a:latin typeface="Roboto" panose="02000000000000000000" pitchFamily="2" charset="0"/>
+                <a:ea typeface="Roboto" panose="02000000000000000000" pitchFamily="2" charset="0"/>
+                <a:cs typeface="Roboto" panose="02000000000000000000" pitchFamily="2" charset="0"/>
+              </a:rPr>
+              <a:t>DE </a:t>
+            </a:r>
+            <a:r>
+              <a:rPr lang="pt-BR" b="1" i="1" dirty="0">
+                <a:latin typeface="Roboto" panose="02000000000000000000" pitchFamily="2" charset="0"/>
+                <a:ea typeface="Roboto" panose="02000000000000000000" pitchFamily="2" charset="0"/>
+                <a:cs typeface="Roboto" panose="02000000000000000000" pitchFamily="2" charset="0"/>
+              </a:rPr>
+              <a:t>CPU</a:t>
+            </a:r>
+            <a:r>
+              <a:rPr lang="pt-BR" i="1" dirty="0">
+                <a:latin typeface="Roboto" panose="02000000000000000000" pitchFamily="2" charset="0"/>
+                <a:ea typeface="Roboto" panose="02000000000000000000" pitchFamily="2" charset="0"/>
+                <a:cs typeface="Roboto" panose="02000000000000000000" pitchFamily="2" charset="0"/>
+              </a:rPr>
+              <a:t> E </a:t>
+            </a:r>
+            <a:r>
+              <a:rPr lang="pt-BR" b="1" i="1" dirty="0">
+                <a:latin typeface="Roboto" panose="02000000000000000000" pitchFamily="2" charset="0"/>
+                <a:ea typeface="Roboto" panose="02000000000000000000" pitchFamily="2" charset="0"/>
+                <a:cs typeface="Roboto" panose="02000000000000000000" pitchFamily="2" charset="0"/>
+              </a:rPr>
+              <a:t>SHUTDOWN</a:t>
+            </a:r>
+            <a:r>
+              <a:rPr lang="pt-BR" i="1" dirty="0">
+                <a:latin typeface="Roboto" panose="02000000000000000000" pitchFamily="2" charset="0"/>
+                <a:ea typeface="Roboto" panose="02000000000000000000" pitchFamily="2" charset="0"/>
+                <a:cs typeface="Roboto" panose="02000000000000000000" pitchFamily="2" charset="0"/>
+              </a:rPr>
+              <a:t> COM </a:t>
+            </a:r>
+            <a:r>
+              <a:rPr lang="pt-BR" b="1" i="1" dirty="0">
+                <a:latin typeface="Roboto" panose="02000000000000000000" pitchFamily="2" charset="0"/>
+                <a:ea typeface="Roboto" panose="02000000000000000000" pitchFamily="2" charset="0"/>
+                <a:cs typeface="Roboto" panose="02000000000000000000" pitchFamily="2" charset="0"/>
+              </a:rPr>
+              <a:t>GREMLIN</a:t>
+            </a:r>
+          </a:p>
+        </p:txBody>
+      </p:sp>
+      <p:cxnSp>
+        <p:nvCxnSpPr>
+          <p:cNvPr id="101" name="Conector de Seta Reta 100"/>
+          <p:cNvCxnSpPr/>
+          <p:nvPr/>
+        </p:nvCxnSpPr>
+        <p:spPr>
+          <a:xfrm flipV="1">
+            <a:off x="11136681" y="2988671"/>
+            <a:ext cx="28522" cy="880472"/>
+          </a:xfrm>
+          <a:prstGeom prst="straightConnector1">
+            <a:avLst/>
+          </a:prstGeom>
+          <a:ln w="57150">
+            <a:solidFill>
+              <a:schemeClr val="tx1">
+                <a:lumMod val="50000"/>
+                <a:lumOff val="50000"/>
+              </a:schemeClr>
+            </a:solidFill>
+            <a:tailEnd type="triangle"/>
+          </a:ln>
+        </p:spPr>
+        <p:style>
+          <a:lnRef idx="1">
+            <a:schemeClr val="accent1"/>
+          </a:lnRef>
+          <a:fillRef idx="0">
+            <a:schemeClr val="accent1"/>
+          </a:fillRef>
+          <a:effectRef idx="0">
+            <a:schemeClr val="accent1"/>
+          </a:effectRef>
+          <a:fontRef idx="minor">
+            <a:schemeClr val="tx1"/>
+          </a:fontRef>
+        </p:style>
+      </p:cxnSp>
+      <p:pic>
+        <p:nvPicPr>
+          <p:cNvPr id="3" name="Imagem 2">
+            <a:extLst>
+              <a:ext uri="{FF2B5EF4-FFF2-40B4-BE49-F238E27FC236}">
+                <a16:creationId xmlns:a16="http://schemas.microsoft.com/office/drawing/2014/main" id="{10B15967-B736-4459-9A79-72CA7DBE35F4}"/>
+              </a:ext>
+            </a:extLst>
+          </p:cNvPr>
+          <p:cNvPicPr>
+            <a:picLocks noChangeAspect="1"/>
+          </p:cNvPicPr>
+          <p:nvPr/>
+        </p:nvPicPr>
+        <p:blipFill>
+          <a:blip r:embed="rId10" cstate="print">
+            <a:extLst>
+              <a:ext uri="{28A0092B-C50C-407E-A947-70E740481C1C}">
+                <a14:useLocalDpi xmlns:a14="http://schemas.microsoft.com/office/drawing/2010/main" val="0"/>
+              </a:ext>
+            </a:extLst>
+          </a:blip>
+          <a:stretch>
+            <a:fillRect/>
+          </a:stretch>
+        </p:blipFill>
+        <p:spPr>
+          <a:xfrm>
+            <a:off x="219831" y="6207572"/>
+            <a:ext cx="1796681" cy="485087"/>
+          </a:xfrm>
+          <a:prstGeom prst="rect">
+            <a:avLst/>
+          </a:prstGeom>
+        </p:spPr>
+      </p:pic>
+    </p:spTree>
+    <p:extLst>
+      <p:ext uri="{BB962C8B-B14F-4D97-AF65-F5344CB8AC3E}">
+        <p14:creationId xmlns:p14="http://schemas.microsoft.com/office/powerpoint/2010/main" val="2638324179"/>
+      </p:ext>
+    </p:extLst>
+  </p:cSld>
+  <p:clrMapOvr>
+    <a:masterClrMapping/>
+  </p:clrMapOvr>
+  <p:timing>
+    <p:tnLst>
+      <p:par>
+        <p:cTn id="1" dur="indefinite" restart="never" nodeType="tmRoot"/>
+      </p:par>
+    </p:tnLst>
+  </p:timing>
+</p:sld>
+</file>
+
+<file path=ppt/slides/slide8.xml><?xml version="1.0" encoding="utf-8"?>
+<p:sld xmlns:a="http://schemas.openxmlformats.org/drawingml/2006/main" xmlns:r="http://schemas.openxmlformats.org/officeDocument/2006/relationships" xmlns:p="http://schemas.openxmlformats.org/presentationml/2006/main">
+  <p:cSld>
+    <p:bg>
+      <p:bgPr>
+        <a:solidFill>
+          <a:schemeClr val="bg1">
+            <a:lumMod val="85000"/>
+            <a:alpha val="70000"/>
+          </a:schemeClr>
+        </a:solidFill>
+        <a:effectLst/>
+      </p:bgPr>
+    </p:bg>
+    <p:spTree>
+      <p:nvGrpSpPr>
+        <p:cNvPr id="1" name=""/>
+        <p:cNvGrpSpPr/>
+        <p:nvPr/>
+      </p:nvGrpSpPr>
+      <p:grpSpPr>
+        <a:xfrm>
+          <a:off x="0" y="0"/>
+          <a:ext cx="0" cy="0"/>
+          <a:chOff x="0" y="0"/>
+          <a:chExt cx="0" cy="0"/>
+        </a:xfrm>
+      </p:grpSpPr>
+      <p:pic>
+        <p:nvPicPr>
           <p:cNvPr id="91" name="Imagem 90"/>
           <p:cNvPicPr>
             <a:picLocks noChangeAspect="1"/>
@@ -4138,13 +7954,20 @@
     </p:spTree>
     <p:extLst>
       <p:ext uri="{BB962C8B-B14F-4D97-AF65-F5344CB8AC3E}">
-        <p14:creationId xmlns:p14="http://schemas.microsoft.com/office/powerpoint/2010/main" val="3413843860"/>
+        <p14:creationId xmlns:p14="http://schemas.microsoft.com/office/powerpoint/2010/main" val="2813192404"/>
       </p:ext>
     </p:extLst>
   </p:cSld>
   <p:clrMapOvr>
     <a:masterClrMapping/>
   </p:clrMapOvr>
+  <p:timing>
+    <p:tnLst>
+      <p:par>
+        <p:cTn id="1" dur="indefinite" restart="never" nodeType="tmRoot"/>
+      </p:par>
+    </p:tnLst>
+  </p:timing>
 </p:sld>
 </file>
 

</xml_diff>